<commit_message>
[rtc/AutoBalancer/hrpsys_AutoBalancer_GaitGenerator_memo.pptx] Update memo slide to add footstep overwriting
</commit_message>
<xml_diff>
--- a/rtc/AutoBalancer/hrpsys_AutoBalancer_GaitGenerator_memo.pptx
+++ b/rtc/AutoBalancer/hrpsys_AutoBalancer_GaitGenerator_memo.pptx
@@ -5,10 +5,10 @@
     <p:sldMasterId id="2147483660" r:id="rId1"/>
   </p:sldMasterIdLst>
   <p:notesMasterIdLst>
-    <p:notesMasterId r:id="rId13"/>
+    <p:notesMasterId r:id="rId15"/>
   </p:notesMasterIdLst>
   <p:handoutMasterIdLst>
-    <p:handoutMasterId r:id="rId14"/>
+    <p:handoutMasterId r:id="rId16"/>
   </p:handoutMasterIdLst>
   <p:sldIdLst>
     <p:sldId id="260" r:id="rId2"/>
@@ -22,6 +22,8 @@
     <p:sldId id="270" r:id="rId10"/>
     <p:sldId id="272" r:id="rId11"/>
     <p:sldId id="273" r:id="rId12"/>
+    <p:sldId id="274" r:id="rId13"/>
+    <p:sldId id="275" r:id="rId14"/>
   </p:sldIdLst>
   <p:sldSz cx="9144000" cy="6858000" type="screen4x3"/>
   <p:notesSz cx="6743700" cy="9893300"/>
@@ -210,7 +212,7 @@
           <a:p>
             <a:fld id="{D420EF64-268C-4638-9A2F-D81578213C83}" type="datetimeFigureOut">
               <a:rPr kumimoji="1" lang="ja-JP" altLang="en-US" smtClean="0"/>
-              <a:t>2015/7/17</a:t>
+              <a:t>2015/7/19</a:t>
             </a:fld>
             <a:endParaRPr kumimoji="1" lang="ja-JP" altLang="en-US"/>
           </a:p>
@@ -375,7 +377,7 @@
           <a:p>
             <a:fld id="{76DD3505-4ACD-46D8-B7C5-3B319715F540}" type="datetimeFigureOut">
               <a:rPr kumimoji="1" lang="ja-JP" altLang="en-US" smtClean="0"/>
-              <a:t>2015/7/17</a:t>
+              <a:t>2015/7/19</a:t>
             </a:fld>
             <a:endParaRPr kumimoji="1" lang="ja-JP" altLang="en-US"/>
           </a:p>
@@ -843,6 +845,174 @@
 </p:notes>
 </file>
 
+<file path=ppt/notesSlides/notesSlide3.xml><?xml version="1.0" encoding="utf-8"?>
+<p:notes xmlns:a="http://schemas.openxmlformats.org/drawingml/2006/main" xmlns:r="http://schemas.openxmlformats.org/officeDocument/2006/relationships" xmlns:p="http://schemas.openxmlformats.org/presentationml/2006/main">
+  <p:cSld>
+    <p:spTree>
+      <p:nvGrpSpPr>
+        <p:cNvPr id="1" name=""/>
+        <p:cNvGrpSpPr/>
+        <p:nvPr/>
+      </p:nvGrpSpPr>
+      <p:grpSpPr>
+        <a:xfrm>
+          <a:off x="0" y="0"/>
+          <a:ext cx="0" cy="0"/>
+          <a:chOff x="0" y="0"/>
+          <a:chExt cx="0" cy="0"/>
+        </a:xfrm>
+      </p:grpSpPr>
+      <p:sp>
+        <p:nvSpPr>
+          <p:cNvPr id="2" name="スライド イメージ プレースホルダー 1"/>
+          <p:cNvSpPr>
+            <a:spLocks noGrp="1" noRot="1" noChangeAspect="1"/>
+          </p:cNvSpPr>
+          <p:nvPr>
+            <p:ph type="sldImg"/>
+          </p:nvPr>
+        </p:nvSpPr>
+        <p:spPr/>
+      </p:sp>
+      <p:sp>
+        <p:nvSpPr>
+          <p:cNvPr id="3" name="ノート プレースホルダー 2"/>
+          <p:cNvSpPr>
+            <a:spLocks noGrp="1"/>
+          </p:cNvSpPr>
+          <p:nvPr>
+            <p:ph type="body" idx="1"/>
+          </p:nvPr>
+        </p:nvSpPr>
+        <p:spPr/>
+        <p:txBody>
+          <a:bodyPr/>
+          <a:lstStyle/>
+          <a:p>
+            <a:endParaRPr kumimoji="1" lang="ja-JP" altLang="en-US" dirty="0"/>
+          </a:p>
+        </p:txBody>
+      </p:sp>
+      <p:sp>
+        <p:nvSpPr>
+          <p:cNvPr id="4" name="スライド番号プレースホルダー 3"/>
+          <p:cNvSpPr>
+            <a:spLocks noGrp="1"/>
+          </p:cNvSpPr>
+          <p:nvPr>
+            <p:ph type="sldNum" sz="quarter" idx="10"/>
+          </p:nvPr>
+        </p:nvSpPr>
+        <p:spPr/>
+        <p:txBody>
+          <a:bodyPr/>
+          <a:lstStyle/>
+          <a:p>
+            <a:fld id="{02033F7A-A7A5-4B4D-AC9A-984A3F1DC19E}" type="slidenum">
+              <a:rPr kumimoji="1" lang="ja-JP" altLang="en-US" smtClean="0"/>
+              <a:t>12</a:t>
+            </a:fld>
+            <a:endParaRPr kumimoji="1" lang="ja-JP" altLang="en-US"/>
+          </a:p>
+        </p:txBody>
+      </p:sp>
+    </p:spTree>
+    <p:extLst>
+      <p:ext uri="{BB962C8B-B14F-4D97-AF65-F5344CB8AC3E}">
+        <p14:creationId xmlns:p14="http://schemas.microsoft.com/office/powerpoint/2010/main" val="3692561189"/>
+      </p:ext>
+    </p:extLst>
+  </p:cSld>
+  <p:clrMapOvr>
+    <a:masterClrMapping/>
+  </p:clrMapOvr>
+</p:notes>
+</file>
+
+<file path=ppt/notesSlides/notesSlide4.xml><?xml version="1.0" encoding="utf-8"?>
+<p:notes xmlns:a="http://schemas.openxmlformats.org/drawingml/2006/main" xmlns:r="http://schemas.openxmlformats.org/officeDocument/2006/relationships" xmlns:p="http://schemas.openxmlformats.org/presentationml/2006/main">
+  <p:cSld>
+    <p:spTree>
+      <p:nvGrpSpPr>
+        <p:cNvPr id="1" name=""/>
+        <p:cNvGrpSpPr/>
+        <p:nvPr/>
+      </p:nvGrpSpPr>
+      <p:grpSpPr>
+        <a:xfrm>
+          <a:off x="0" y="0"/>
+          <a:ext cx="0" cy="0"/>
+          <a:chOff x="0" y="0"/>
+          <a:chExt cx="0" cy="0"/>
+        </a:xfrm>
+      </p:grpSpPr>
+      <p:sp>
+        <p:nvSpPr>
+          <p:cNvPr id="2" name="スライド イメージ プレースホルダー 1"/>
+          <p:cNvSpPr>
+            <a:spLocks noGrp="1" noRot="1" noChangeAspect="1"/>
+          </p:cNvSpPr>
+          <p:nvPr>
+            <p:ph type="sldImg"/>
+          </p:nvPr>
+        </p:nvSpPr>
+        <p:spPr/>
+      </p:sp>
+      <p:sp>
+        <p:nvSpPr>
+          <p:cNvPr id="3" name="ノート プレースホルダー 2"/>
+          <p:cNvSpPr>
+            <a:spLocks noGrp="1"/>
+          </p:cNvSpPr>
+          <p:nvPr>
+            <p:ph type="body" idx="1"/>
+          </p:nvPr>
+        </p:nvSpPr>
+        <p:spPr/>
+        <p:txBody>
+          <a:bodyPr/>
+          <a:lstStyle/>
+          <a:p>
+            <a:endParaRPr kumimoji="1" lang="ja-JP" altLang="en-US" dirty="0"/>
+          </a:p>
+        </p:txBody>
+      </p:sp>
+      <p:sp>
+        <p:nvSpPr>
+          <p:cNvPr id="4" name="スライド番号プレースホルダー 3"/>
+          <p:cNvSpPr>
+            <a:spLocks noGrp="1"/>
+          </p:cNvSpPr>
+          <p:nvPr>
+            <p:ph type="sldNum" sz="quarter" idx="10"/>
+          </p:nvPr>
+        </p:nvSpPr>
+        <p:spPr/>
+        <p:txBody>
+          <a:bodyPr/>
+          <a:lstStyle/>
+          <a:p>
+            <a:fld id="{02033F7A-A7A5-4B4D-AC9A-984A3F1DC19E}" type="slidenum">
+              <a:rPr kumimoji="1" lang="ja-JP" altLang="en-US" smtClean="0"/>
+              <a:t>13</a:t>
+            </a:fld>
+            <a:endParaRPr kumimoji="1" lang="ja-JP" altLang="en-US"/>
+          </a:p>
+        </p:txBody>
+      </p:sp>
+    </p:spTree>
+    <p:extLst>
+      <p:ext uri="{BB962C8B-B14F-4D97-AF65-F5344CB8AC3E}">
+        <p14:creationId xmlns:p14="http://schemas.microsoft.com/office/powerpoint/2010/main" val="2815173538"/>
+      </p:ext>
+    </p:extLst>
+  </p:cSld>
+  <p:clrMapOvr>
+    <a:masterClrMapping/>
+  </p:clrMapOvr>
+</p:notes>
+</file>
+
 <file path=ppt/slideLayouts/slideLayout1.xml><?xml version="1.0" encoding="utf-8"?>
 <p:sldLayout xmlns:a="http://schemas.openxmlformats.org/drawingml/2006/main" xmlns:r="http://schemas.openxmlformats.org/officeDocument/2006/relationships" xmlns:p="http://schemas.openxmlformats.org/presentationml/2006/main" type="title" preserve="1">
   <p:cSld name="タイトル スライド">
@@ -974,7 +1144,7 @@
           <a:p>
             <a:fld id="{DD4B1FD6-0E76-429E-8BDB-39412EBD3D56}" type="datetimeFigureOut">
               <a:rPr kumimoji="1" lang="ja-JP" altLang="en-US" smtClean="0"/>
-              <a:t>2015/7/17</a:t>
+              <a:t>2015/7/19</a:t>
             </a:fld>
             <a:endParaRPr kumimoji="1" lang="ja-JP" altLang="en-US"/>
           </a:p>
@@ -1176,7 +1346,7 @@
           <a:p>
             <a:fld id="{DD4B1FD6-0E76-429E-8BDB-39412EBD3D56}" type="datetimeFigureOut">
               <a:rPr kumimoji="1" lang="ja-JP" altLang="en-US" smtClean="0"/>
-              <a:t>2015/7/17</a:t>
+              <a:t>2015/7/19</a:t>
             </a:fld>
             <a:endParaRPr kumimoji="1" lang="ja-JP" altLang="en-US"/>
           </a:p>
@@ -1388,7 +1558,7 @@
           <a:p>
             <a:fld id="{DD4B1FD6-0E76-429E-8BDB-39412EBD3D56}" type="datetimeFigureOut">
               <a:rPr kumimoji="1" lang="ja-JP" altLang="en-US" smtClean="0"/>
-              <a:t>2015/7/17</a:t>
+              <a:t>2015/7/19</a:t>
             </a:fld>
             <a:endParaRPr kumimoji="1" lang="ja-JP" altLang="en-US"/>
           </a:p>
@@ -1590,7 +1760,7 @@
           <a:p>
             <a:fld id="{DD4B1FD6-0E76-429E-8BDB-39412EBD3D56}" type="datetimeFigureOut">
               <a:rPr kumimoji="1" lang="ja-JP" altLang="en-US" smtClean="0"/>
-              <a:t>2015/7/17</a:t>
+              <a:t>2015/7/19</a:t>
             </a:fld>
             <a:endParaRPr kumimoji="1" lang="ja-JP" altLang="en-US"/>
           </a:p>
@@ -1834,7 +2004,7 @@
           <a:p>
             <a:fld id="{DD4B1FD6-0E76-429E-8BDB-39412EBD3D56}" type="datetimeFigureOut">
               <a:rPr kumimoji="1" lang="ja-JP" altLang="en-US" smtClean="0"/>
-              <a:t>2015/7/17</a:t>
+              <a:t>2015/7/19</a:t>
             </a:fld>
             <a:endParaRPr kumimoji="1" lang="ja-JP" altLang="en-US"/>
           </a:p>
@@ -2130,7 +2300,7 @@
           <a:p>
             <a:fld id="{DD4B1FD6-0E76-429E-8BDB-39412EBD3D56}" type="datetimeFigureOut">
               <a:rPr kumimoji="1" lang="ja-JP" altLang="en-US" smtClean="0"/>
-              <a:t>2015/7/17</a:t>
+              <a:t>2015/7/19</a:t>
             </a:fld>
             <a:endParaRPr kumimoji="1" lang="ja-JP" altLang="en-US"/>
           </a:p>
@@ -2561,7 +2731,7 @@
           <a:p>
             <a:fld id="{DD4B1FD6-0E76-429E-8BDB-39412EBD3D56}" type="datetimeFigureOut">
               <a:rPr kumimoji="1" lang="ja-JP" altLang="en-US" smtClean="0"/>
-              <a:t>2015/7/17</a:t>
+              <a:t>2015/7/19</a:t>
             </a:fld>
             <a:endParaRPr kumimoji="1" lang="ja-JP" altLang="en-US"/>
           </a:p>
@@ -2679,7 +2849,7 @@
           <a:p>
             <a:fld id="{DD4B1FD6-0E76-429E-8BDB-39412EBD3D56}" type="datetimeFigureOut">
               <a:rPr kumimoji="1" lang="ja-JP" altLang="en-US" smtClean="0"/>
-              <a:t>2015/7/17</a:t>
+              <a:t>2015/7/19</a:t>
             </a:fld>
             <a:endParaRPr kumimoji="1" lang="ja-JP" altLang="en-US"/>
           </a:p>
@@ -2774,7 +2944,7 @@
           <a:p>
             <a:fld id="{DD4B1FD6-0E76-429E-8BDB-39412EBD3D56}" type="datetimeFigureOut">
               <a:rPr kumimoji="1" lang="ja-JP" altLang="en-US" smtClean="0"/>
-              <a:t>2015/7/17</a:t>
+              <a:t>2015/7/19</a:t>
             </a:fld>
             <a:endParaRPr kumimoji="1" lang="ja-JP" altLang="en-US"/>
           </a:p>
@@ -3083,7 +3253,7 @@
           <a:p>
             <a:fld id="{DD4B1FD6-0E76-429E-8BDB-39412EBD3D56}" type="datetimeFigureOut">
               <a:rPr kumimoji="1" lang="ja-JP" altLang="en-US" smtClean="0"/>
-              <a:t>2015/7/17</a:t>
+              <a:t>2015/7/19</a:t>
             </a:fld>
             <a:endParaRPr kumimoji="1" lang="ja-JP" altLang="en-US"/>
           </a:p>
@@ -3340,7 +3510,7 @@
           <a:p>
             <a:fld id="{DD4B1FD6-0E76-429E-8BDB-39412EBD3D56}" type="datetimeFigureOut">
               <a:rPr kumimoji="1" lang="ja-JP" altLang="en-US" smtClean="0"/>
-              <a:t>2015/7/17</a:t>
+              <a:t>2015/7/19</a:t>
             </a:fld>
             <a:endParaRPr kumimoji="1" lang="ja-JP" altLang="en-US"/>
           </a:p>
@@ -3585,7 +3755,7 @@
           <a:p>
             <a:fld id="{DD4B1FD6-0E76-429E-8BDB-39412EBD3D56}" type="datetimeFigureOut">
               <a:rPr kumimoji="1" lang="ja-JP" altLang="en-US" smtClean="0"/>
-              <a:t>2015/7/17</a:t>
+              <a:t>2015/7/19</a:t>
             </a:fld>
             <a:endParaRPr kumimoji="1" lang="ja-JP" altLang="en-US"/>
           </a:p>
@@ -5381,6 +5551,2660 @@
     <p:extLst>
       <p:ext uri="{BB962C8B-B14F-4D97-AF65-F5344CB8AC3E}">
         <p14:creationId xmlns:p14="http://schemas.microsoft.com/office/powerpoint/2010/main" val="794196264"/>
+      </p:ext>
+    </p:extLst>
+  </p:cSld>
+  <p:clrMapOvr>
+    <a:masterClrMapping/>
+  </p:clrMapOvr>
+  <p:timing>
+    <p:tnLst>
+      <p:par>
+        <p:cTn id="1" dur="indefinite" restart="never" nodeType="tmRoot"/>
+      </p:par>
+    </p:tnLst>
+  </p:timing>
+</p:sld>
+</file>
+
+<file path=ppt/slides/slide12.xml><?xml version="1.0" encoding="utf-8"?>
+<p:sld xmlns:a="http://schemas.openxmlformats.org/drawingml/2006/main" xmlns:r="http://schemas.openxmlformats.org/officeDocument/2006/relationships" xmlns:p="http://schemas.openxmlformats.org/presentationml/2006/main">
+  <p:cSld>
+    <p:spTree>
+      <p:nvGrpSpPr>
+        <p:cNvPr id="1" name=""/>
+        <p:cNvGrpSpPr/>
+        <p:nvPr/>
+      </p:nvGrpSpPr>
+      <p:grpSpPr>
+        <a:xfrm>
+          <a:off x="0" y="0"/>
+          <a:ext cx="0" cy="0"/>
+          <a:chOff x="0" y="0"/>
+          <a:chExt cx="0" cy="0"/>
+        </a:xfrm>
+      </p:grpSpPr>
+      <p:sp>
+        <p:nvSpPr>
+          <p:cNvPr id="2" name="タイトル 1"/>
+          <p:cNvSpPr>
+            <a:spLocks noGrp="1"/>
+          </p:cNvSpPr>
+          <p:nvPr>
+            <p:ph type="title"/>
+          </p:nvPr>
+        </p:nvSpPr>
+        <p:spPr>
+          <a:xfrm>
+            <a:off x="463681" y="32612"/>
+            <a:ext cx="7886700" cy="1325563"/>
+          </a:xfrm>
+        </p:spPr>
+        <p:txBody>
+          <a:bodyPr>
+            <a:normAutofit/>
+          </a:bodyPr>
+          <a:lstStyle/>
+          <a:p>
+            <a:r>
+              <a:rPr kumimoji="1" lang="en-US" altLang="ja-JP" sz="3200" dirty="0" smtClean="0"/>
+              <a:t>Footsteps</a:t>
+            </a:r>
+            <a:br>
+              <a:rPr kumimoji="1" lang="en-US" altLang="ja-JP" sz="3200" dirty="0" smtClean="0"/>
+            </a:br>
+            <a:r>
+              <a:rPr lang="en-US" altLang="ja-JP" sz="3200" dirty="0" smtClean="0"/>
+              <a:t>(index, </a:t>
+            </a:r>
+            <a:r>
+              <a:rPr lang="en-US" altLang="ja-JP" sz="3200" dirty="0" err="1" smtClean="0"/>
+              <a:t>overwritable</a:t>
+            </a:r>
+            <a:r>
+              <a:rPr lang="en-US" altLang="ja-JP" sz="3200" dirty="0" smtClean="0"/>
+              <a:t>, remaining)</a:t>
+            </a:r>
+            <a:endParaRPr kumimoji="1" lang="ja-JP" altLang="en-US" sz="3200" dirty="0"/>
+          </a:p>
+        </p:txBody>
+      </p:sp>
+      <p:sp>
+        <p:nvSpPr>
+          <p:cNvPr id="4" name="正方形/長方形 3"/>
+          <p:cNvSpPr/>
+          <p:nvPr/>
+        </p:nvSpPr>
+        <p:spPr>
+          <a:xfrm>
+            <a:off x="424192" y="2480093"/>
+            <a:ext cx="410363" cy="721936"/>
+          </a:xfrm>
+          <a:prstGeom prst="rect">
+            <a:avLst/>
+          </a:prstGeom>
+        </p:spPr>
+        <p:style>
+          <a:lnRef idx="2">
+            <a:schemeClr val="accent1">
+              <a:shade val="50000"/>
+            </a:schemeClr>
+          </a:lnRef>
+          <a:fillRef idx="1">
+            <a:schemeClr val="accent1"/>
+          </a:fillRef>
+          <a:effectRef idx="0">
+            <a:schemeClr val="accent1"/>
+          </a:effectRef>
+          <a:fontRef idx="minor">
+            <a:schemeClr val="lt1"/>
+          </a:fontRef>
+        </p:style>
+        <p:txBody>
+          <a:bodyPr rtlCol="0" anchor="ctr"/>
+          <a:lstStyle/>
+          <a:p>
+            <a:pPr algn="ctr"/>
+            <a:r>
+              <a:rPr lang="en-US" altLang="ja-JP" dirty="0"/>
+              <a:t>0</a:t>
+            </a:r>
+            <a:endParaRPr kumimoji="1" lang="ja-JP" altLang="en-US" dirty="0"/>
+          </a:p>
+        </p:txBody>
+      </p:sp>
+      <p:sp>
+        <p:nvSpPr>
+          <p:cNvPr id="5" name="正方形/長方形 4"/>
+          <p:cNvSpPr/>
+          <p:nvPr/>
+        </p:nvSpPr>
+        <p:spPr>
+          <a:xfrm>
+            <a:off x="1159408" y="2480093"/>
+            <a:ext cx="410363" cy="721936"/>
+          </a:xfrm>
+          <a:prstGeom prst="rect">
+            <a:avLst/>
+          </a:prstGeom>
+        </p:spPr>
+        <p:style>
+          <a:lnRef idx="2">
+            <a:schemeClr val="accent1">
+              <a:shade val="50000"/>
+            </a:schemeClr>
+          </a:lnRef>
+          <a:fillRef idx="1">
+            <a:schemeClr val="accent1"/>
+          </a:fillRef>
+          <a:effectRef idx="0">
+            <a:schemeClr val="accent1"/>
+          </a:effectRef>
+          <a:fontRef idx="minor">
+            <a:schemeClr val="lt1"/>
+          </a:fontRef>
+        </p:style>
+        <p:txBody>
+          <a:bodyPr rtlCol="0" anchor="ctr"/>
+          <a:lstStyle/>
+          <a:p>
+            <a:pPr algn="ctr"/>
+            <a:endParaRPr kumimoji="1" lang="ja-JP" altLang="en-US" dirty="0"/>
+          </a:p>
+        </p:txBody>
+      </p:sp>
+      <p:sp>
+        <p:nvSpPr>
+          <p:cNvPr id="6" name="テキスト ボックス 5"/>
+          <p:cNvSpPr txBox="1"/>
+          <p:nvPr/>
+        </p:nvSpPr>
+        <p:spPr>
+          <a:xfrm>
+            <a:off x="259201" y="3478597"/>
+            <a:ext cx="911788" cy="369332"/>
+          </a:xfrm>
+          <a:prstGeom prst="rect">
+            <a:avLst/>
+          </a:prstGeom>
+          <a:noFill/>
+        </p:spPr>
+        <p:txBody>
+          <a:bodyPr wrap="none" rtlCol="0">
+            <a:spAutoFit/>
+          </a:bodyPr>
+          <a:lstStyle/>
+          <a:p>
+            <a:r>
+              <a:rPr lang="en-US" altLang="ja-JP" b="1" dirty="0" smtClean="0"/>
+              <a:t>Input</a:t>
+            </a:r>
+            <a:r>
+              <a:rPr lang="ja-JP" altLang="en-US" b="1" dirty="0"/>
+              <a:t> </a:t>
+            </a:r>
+            <a:r>
+              <a:rPr lang="en-US" altLang="ja-JP" b="1" dirty="0" smtClean="0"/>
+              <a:t>fs</a:t>
+            </a:r>
+          </a:p>
+        </p:txBody>
+      </p:sp>
+      <p:sp>
+        <p:nvSpPr>
+          <p:cNvPr id="7" name="正方形/長方形 6"/>
+          <p:cNvSpPr/>
+          <p:nvPr/>
+        </p:nvSpPr>
+        <p:spPr>
+          <a:xfrm>
+            <a:off x="423468" y="1329721"/>
+            <a:ext cx="410363" cy="721936"/>
+          </a:xfrm>
+          <a:prstGeom prst="rect">
+            <a:avLst/>
+          </a:prstGeom>
+        </p:spPr>
+        <p:style>
+          <a:lnRef idx="2">
+            <a:schemeClr val="accent1">
+              <a:shade val="50000"/>
+            </a:schemeClr>
+          </a:lnRef>
+          <a:fillRef idx="1">
+            <a:schemeClr val="accent1"/>
+          </a:fillRef>
+          <a:effectRef idx="0">
+            <a:schemeClr val="accent1"/>
+          </a:effectRef>
+          <a:fontRef idx="minor">
+            <a:schemeClr val="lt1"/>
+          </a:fontRef>
+        </p:style>
+        <p:txBody>
+          <a:bodyPr rtlCol="0" anchor="ctr"/>
+          <a:lstStyle/>
+          <a:p>
+            <a:pPr algn="ctr"/>
+            <a:r>
+              <a:rPr lang="en-US" altLang="ja-JP" dirty="0" smtClean="0"/>
+              <a:t>2</a:t>
+            </a:r>
+            <a:endParaRPr kumimoji="1" lang="ja-JP" altLang="en-US" dirty="0"/>
+          </a:p>
+        </p:txBody>
+      </p:sp>
+      <p:sp>
+        <p:nvSpPr>
+          <p:cNvPr id="8" name="正方形/長方形 7"/>
+          <p:cNvSpPr/>
+          <p:nvPr/>
+        </p:nvSpPr>
+        <p:spPr>
+          <a:xfrm>
+            <a:off x="1159407" y="1329721"/>
+            <a:ext cx="410363" cy="721936"/>
+          </a:xfrm>
+          <a:prstGeom prst="rect">
+            <a:avLst/>
+          </a:prstGeom>
+        </p:spPr>
+        <p:style>
+          <a:lnRef idx="2">
+            <a:schemeClr val="accent1">
+              <a:shade val="50000"/>
+            </a:schemeClr>
+          </a:lnRef>
+          <a:fillRef idx="1">
+            <a:schemeClr val="accent1"/>
+          </a:fillRef>
+          <a:effectRef idx="0">
+            <a:schemeClr val="accent1"/>
+          </a:effectRef>
+          <a:fontRef idx="minor">
+            <a:schemeClr val="lt1"/>
+          </a:fontRef>
+        </p:style>
+        <p:txBody>
+          <a:bodyPr rtlCol="0" anchor="ctr"/>
+          <a:lstStyle/>
+          <a:p>
+            <a:pPr algn="ctr"/>
+            <a:r>
+              <a:rPr lang="en-US" altLang="ja-JP" dirty="0"/>
+              <a:t>1</a:t>
+            </a:r>
+            <a:endParaRPr lang="en-US" altLang="ja-JP" dirty="0" smtClean="0"/>
+          </a:p>
+        </p:txBody>
+      </p:sp>
+      <p:sp>
+        <p:nvSpPr>
+          <p:cNvPr id="14" name="正方形/長方形 13"/>
+          <p:cNvSpPr/>
+          <p:nvPr/>
+        </p:nvSpPr>
+        <p:spPr>
+          <a:xfrm>
+            <a:off x="4545981" y="2512192"/>
+            <a:ext cx="410363" cy="721936"/>
+          </a:xfrm>
+          <a:prstGeom prst="rect">
+            <a:avLst/>
+          </a:prstGeom>
+        </p:spPr>
+        <p:style>
+          <a:lnRef idx="2">
+            <a:schemeClr val="accent1">
+              <a:shade val="50000"/>
+            </a:schemeClr>
+          </a:lnRef>
+          <a:fillRef idx="1">
+            <a:schemeClr val="accent1"/>
+          </a:fillRef>
+          <a:effectRef idx="0">
+            <a:schemeClr val="accent1"/>
+          </a:effectRef>
+          <a:fontRef idx="minor">
+            <a:schemeClr val="lt1"/>
+          </a:fontRef>
+        </p:style>
+        <p:txBody>
+          <a:bodyPr rtlCol="0" anchor="ctr"/>
+          <a:lstStyle/>
+          <a:p>
+            <a:pPr algn="ctr"/>
+            <a:endParaRPr kumimoji="1" lang="ja-JP" altLang="en-US" dirty="0"/>
+          </a:p>
+        </p:txBody>
+      </p:sp>
+      <p:sp>
+        <p:nvSpPr>
+          <p:cNvPr id="19" name="正方形/長方形 18"/>
+          <p:cNvSpPr/>
+          <p:nvPr/>
+        </p:nvSpPr>
+        <p:spPr>
+          <a:xfrm>
+            <a:off x="5095589" y="2512192"/>
+            <a:ext cx="410363" cy="721936"/>
+          </a:xfrm>
+          <a:prstGeom prst="rect">
+            <a:avLst/>
+          </a:prstGeom>
+          <a:solidFill>
+            <a:schemeClr val="bg1"/>
+          </a:solidFill>
+          <a:ln w="25400">
+            <a:solidFill>
+              <a:srgbClr val="FF0000"/>
+            </a:solidFill>
+            <a:prstDash val="dash"/>
+          </a:ln>
+        </p:spPr>
+        <p:style>
+          <a:lnRef idx="2">
+            <a:schemeClr val="accent1">
+              <a:shade val="50000"/>
+            </a:schemeClr>
+          </a:lnRef>
+          <a:fillRef idx="1">
+            <a:schemeClr val="accent1"/>
+          </a:fillRef>
+          <a:effectRef idx="0">
+            <a:schemeClr val="accent1"/>
+          </a:effectRef>
+          <a:fontRef idx="minor">
+            <a:schemeClr val="lt1"/>
+          </a:fontRef>
+        </p:style>
+        <p:txBody>
+          <a:bodyPr rtlCol="0" anchor="ctr"/>
+          <a:lstStyle/>
+          <a:p>
+            <a:pPr algn="ctr"/>
+            <a:endParaRPr kumimoji="1" lang="ja-JP" altLang="en-US" dirty="0"/>
+          </a:p>
+        </p:txBody>
+      </p:sp>
+      <p:sp>
+        <p:nvSpPr>
+          <p:cNvPr id="22" name="正方形/長方形 21"/>
+          <p:cNvSpPr/>
+          <p:nvPr/>
+        </p:nvSpPr>
+        <p:spPr>
+          <a:xfrm>
+            <a:off x="5095588" y="1329721"/>
+            <a:ext cx="410363" cy="721936"/>
+          </a:xfrm>
+          <a:prstGeom prst="rect">
+            <a:avLst/>
+          </a:prstGeom>
+          <a:solidFill>
+            <a:schemeClr val="bg1"/>
+          </a:solidFill>
+          <a:ln w="25400">
+            <a:solidFill>
+              <a:srgbClr val="00B050"/>
+            </a:solidFill>
+            <a:prstDash val="dash"/>
+          </a:ln>
+        </p:spPr>
+        <p:style>
+          <a:lnRef idx="2">
+            <a:schemeClr val="accent1">
+              <a:shade val="50000"/>
+            </a:schemeClr>
+          </a:lnRef>
+          <a:fillRef idx="1">
+            <a:schemeClr val="accent1"/>
+          </a:fillRef>
+          <a:effectRef idx="0">
+            <a:schemeClr val="accent1"/>
+          </a:effectRef>
+          <a:fontRef idx="minor">
+            <a:schemeClr val="lt1"/>
+          </a:fontRef>
+        </p:style>
+        <p:txBody>
+          <a:bodyPr rtlCol="0" anchor="ctr"/>
+          <a:lstStyle/>
+          <a:p>
+            <a:pPr algn="ctr"/>
+            <a:r>
+              <a:rPr lang="en-US" altLang="ja-JP" dirty="0">
+                <a:solidFill>
+                  <a:schemeClr val="tx1"/>
+                </a:solidFill>
+              </a:rPr>
+              <a:t>1</a:t>
+            </a:r>
+            <a:endParaRPr kumimoji="1" lang="ja-JP" altLang="en-US" dirty="0">
+              <a:solidFill>
+                <a:schemeClr val="tx1"/>
+              </a:solidFill>
+            </a:endParaRPr>
+          </a:p>
+        </p:txBody>
+      </p:sp>
+      <p:cxnSp>
+        <p:nvCxnSpPr>
+          <p:cNvPr id="24" name="直線矢印コネクタ 23"/>
+          <p:cNvCxnSpPr>
+            <a:stCxn id="19" idx="0"/>
+            <a:endCxn id="22" idx="2"/>
+          </p:cNvCxnSpPr>
+          <p:nvPr/>
+        </p:nvCxnSpPr>
+        <p:spPr>
+          <a:xfrm flipH="1" flipV="1">
+            <a:off x="5300770" y="2051657"/>
+            <a:ext cx="1" cy="460535"/>
+          </a:xfrm>
+          <a:prstGeom prst="straightConnector1">
+            <a:avLst/>
+          </a:prstGeom>
+          <a:ln>
+            <a:tailEnd type="triangle"/>
+          </a:ln>
+        </p:spPr>
+        <p:style>
+          <a:lnRef idx="1">
+            <a:schemeClr val="accent1"/>
+          </a:lnRef>
+          <a:fillRef idx="0">
+            <a:schemeClr val="accent1"/>
+          </a:fillRef>
+          <a:effectRef idx="0">
+            <a:schemeClr val="accent1"/>
+          </a:effectRef>
+          <a:fontRef idx="minor">
+            <a:schemeClr val="tx1"/>
+          </a:fontRef>
+        </p:style>
+      </p:cxnSp>
+      <p:sp>
+        <p:nvSpPr>
+          <p:cNvPr id="25" name="正方形/長方形 24"/>
+          <p:cNvSpPr/>
+          <p:nvPr/>
+        </p:nvSpPr>
+        <p:spPr>
+          <a:xfrm>
+            <a:off x="6635547" y="1329721"/>
+            <a:ext cx="410363" cy="721936"/>
+          </a:xfrm>
+          <a:prstGeom prst="rect">
+            <a:avLst/>
+          </a:prstGeom>
+        </p:spPr>
+        <p:style>
+          <a:lnRef idx="2">
+            <a:schemeClr val="accent1">
+              <a:shade val="50000"/>
+            </a:schemeClr>
+          </a:lnRef>
+          <a:fillRef idx="1">
+            <a:schemeClr val="accent1"/>
+          </a:fillRef>
+          <a:effectRef idx="0">
+            <a:schemeClr val="accent1"/>
+          </a:effectRef>
+          <a:fontRef idx="minor">
+            <a:schemeClr val="lt1"/>
+          </a:fontRef>
+        </p:style>
+        <p:txBody>
+          <a:bodyPr rtlCol="0" anchor="ctr"/>
+          <a:lstStyle/>
+          <a:p>
+            <a:pPr algn="ctr"/>
+            <a:endParaRPr kumimoji="1" lang="ja-JP" altLang="en-US" dirty="0"/>
+          </a:p>
+        </p:txBody>
+      </p:sp>
+      <p:sp>
+        <p:nvSpPr>
+          <p:cNvPr id="27" name="正方形/長方形 26"/>
+          <p:cNvSpPr/>
+          <p:nvPr/>
+        </p:nvSpPr>
+        <p:spPr>
+          <a:xfrm>
+            <a:off x="6067600" y="2512192"/>
+            <a:ext cx="410363" cy="721936"/>
+          </a:xfrm>
+          <a:prstGeom prst="rect">
+            <a:avLst/>
+          </a:prstGeom>
+          <a:solidFill>
+            <a:schemeClr val="bg1"/>
+          </a:solidFill>
+          <a:ln w="25400">
+            <a:solidFill>
+              <a:srgbClr val="FF0000"/>
+            </a:solidFill>
+            <a:prstDash val="dash"/>
+          </a:ln>
+        </p:spPr>
+        <p:style>
+          <a:lnRef idx="2">
+            <a:schemeClr val="accent1">
+              <a:shade val="50000"/>
+            </a:schemeClr>
+          </a:lnRef>
+          <a:fillRef idx="1">
+            <a:schemeClr val="accent1"/>
+          </a:fillRef>
+          <a:effectRef idx="0">
+            <a:schemeClr val="accent1"/>
+          </a:effectRef>
+          <a:fontRef idx="minor">
+            <a:schemeClr val="lt1"/>
+          </a:fontRef>
+        </p:style>
+        <p:txBody>
+          <a:bodyPr rtlCol="0" anchor="ctr"/>
+          <a:lstStyle/>
+          <a:p>
+            <a:pPr algn="ctr"/>
+            <a:endParaRPr kumimoji="1" lang="ja-JP" altLang="en-US" dirty="0"/>
+          </a:p>
+        </p:txBody>
+      </p:sp>
+      <p:sp>
+        <p:nvSpPr>
+          <p:cNvPr id="28" name="正方形/長方形 27"/>
+          <p:cNvSpPr/>
+          <p:nvPr/>
+        </p:nvSpPr>
+        <p:spPr>
+          <a:xfrm>
+            <a:off x="6067599" y="1329721"/>
+            <a:ext cx="410363" cy="721936"/>
+          </a:xfrm>
+          <a:prstGeom prst="rect">
+            <a:avLst/>
+          </a:prstGeom>
+          <a:solidFill>
+            <a:schemeClr val="bg1"/>
+          </a:solidFill>
+          <a:ln w="25400">
+            <a:solidFill>
+              <a:srgbClr val="00B050"/>
+            </a:solidFill>
+            <a:prstDash val="dash"/>
+          </a:ln>
+        </p:spPr>
+        <p:style>
+          <a:lnRef idx="2">
+            <a:schemeClr val="accent1">
+              <a:shade val="50000"/>
+            </a:schemeClr>
+          </a:lnRef>
+          <a:fillRef idx="1">
+            <a:schemeClr val="accent1"/>
+          </a:fillRef>
+          <a:effectRef idx="0">
+            <a:schemeClr val="accent1"/>
+          </a:effectRef>
+          <a:fontRef idx="minor">
+            <a:schemeClr val="lt1"/>
+          </a:fontRef>
+        </p:style>
+        <p:txBody>
+          <a:bodyPr rtlCol="0" anchor="ctr"/>
+          <a:lstStyle/>
+          <a:p>
+            <a:pPr algn="ctr"/>
+            <a:r>
+              <a:rPr lang="en-US" altLang="ja-JP" dirty="0">
+                <a:solidFill>
+                  <a:schemeClr val="tx1"/>
+                </a:solidFill>
+              </a:rPr>
+              <a:t>2</a:t>
+            </a:r>
+            <a:endParaRPr kumimoji="1" lang="ja-JP" altLang="en-US" dirty="0">
+              <a:solidFill>
+                <a:schemeClr val="tx1"/>
+              </a:solidFill>
+            </a:endParaRPr>
+          </a:p>
+        </p:txBody>
+      </p:sp>
+      <p:cxnSp>
+        <p:nvCxnSpPr>
+          <p:cNvPr id="29" name="直線矢印コネクタ 28"/>
+          <p:cNvCxnSpPr>
+            <a:stCxn id="27" idx="0"/>
+            <a:endCxn id="28" idx="2"/>
+          </p:cNvCxnSpPr>
+          <p:nvPr/>
+        </p:nvCxnSpPr>
+        <p:spPr>
+          <a:xfrm flipH="1" flipV="1">
+            <a:off x="6272781" y="2051657"/>
+            <a:ext cx="1" cy="460535"/>
+          </a:xfrm>
+          <a:prstGeom prst="straightConnector1">
+            <a:avLst/>
+          </a:prstGeom>
+          <a:ln>
+            <a:tailEnd type="triangle"/>
+          </a:ln>
+        </p:spPr>
+        <p:style>
+          <a:lnRef idx="1">
+            <a:schemeClr val="accent1"/>
+          </a:lnRef>
+          <a:fillRef idx="0">
+            <a:schemeClr val="accent1"/>
+          </a:fillRef>
+          <a:effectRef idx="0">
+            <a:schemeClr val="accent1"/>
+          </a:effectRef>
+          <a:fontRef idx="minor">
+            <a:schemeClr val="tx1"/>
+          </a:fontRef>
+        </p:style>
+      </p:cxnSp>
+      <p:sp>
+        <p:nvSpPr>
+          <p:cNvPr id="30" name="正方形/長方形 29"/>
+          <p:cNvSpPr/>
+          <p:nvPr/>
+        </p:nvSpPr>
+        <p:spPr>
+          <a:xfrm>
+            <a:off x="2886013" y="2512192"/>
+            <a:ext cx="410363" cy="721936"/>
+          </a:xfrm>
+          <a:prstGeom prst="rect">
+            <a:avLst/>
+          </a:prstGeom>
+        </p:spPr>
+        <p:style>
+          <a:lnRef idx="2">
+            <a:schemeClr val="accent1">
+              <a:shade val="50000"/>
+            </a:schemeClr>
+          </a:lnRef>
+          <a:fillRef idx="1">
+            <a:schemeClr val="accent1"/>
+          </a:fillRef>
+          <a:effectRef idx="0">
+            <a:schemeClr val="accent1"/>
+          </a:effectRef>
+          <a:fontRef idx="minor">
+            <a:schemeClr val="lt1"/>
+          </a:fontRef>
+        </p:style>
+        <p:txBody>
+          <a:bodyPr rtlCol="0" anchor="ctr"/>
+          <a:lstStyle/>
+          <a:p>
+            <a:pPr algn="ctr"/>
+            <a:r>
+              <a:rPr lang="en-US" altLang="ja-JP" dirty="0"/>
+              <a:t>0</a:t>
+            </a:r>
+            <a:endParaRPr kumimoji="1" lang="ja-JP" altLang="en-US" dirty="0"/>
+          </a:p>
+        </p:txBody>
+      </p:sp>
+      <p:sp>
+        <p:nvSpPr>
+          <p:cNvPr id="32" name="正方形/長方形 31"/>
+          <p:cNvSpPr/>
+          <p:nvPr/>
+        </p:nvSpPr>
+        <p:spPr>
+          <a:xfrm>
+            <a:off x="3470391" y="2510816"/>
+            <a:ext cx="410363" cy="721936"/>
+          </a:xfrm>
+          <a:prstGeom prst="rect">
+            <a:avLst/>
+          </a:prstGeom>
+        </p:spPr>
+        <p:style>
+          <a:lnRef idx="2">
+            <a:schemeClr val="accent1">
+              <a:shade val="50000"/>
+            </a:schemeClr>
+          </a:lnRef>
+          <a:fillRef idx="1">
+            <a:schemeClr val="accent1"/>
+          </a:fillRef>
+          <a:effectRef idx="0">
+            <a:schemeClr val="accent1"/>
+          </a:effectRef>
+          <a:fontRef idx="minor">
+            <a:schemeClr val="lt1"/>
+          </a:fontRef>
+        </p:style>
+        <p:txBody>
+          <a:bodyPr rtlCol="0" anchor="ctr"/>
+          <a:lstStyle/>
+          <a:p>
+            <a:pPr algn="ctr"/>
+            <a:endParaRPr kumimoji="1" lang="ja-JP" altLang="en-US" dirty="0"/>
+          </a:p>
+        </p:txBody>
+      </p:sp>
+      <p:sp>
+        <p:nvSpPr>
+          <p:cNvPr id="33" name="テキスト ボックス 32"/>
+          <p:cNvSpPr txBox="1"/>
+          <p:nvPr/>
+        </p:nvSpPr>
+        <p:spPr>
+          <a:xfrm>
+            <a:off x="4594772" y="3530210"/>
+            <a:ext cx="1822358" cy="369332"/>
+          </a:xfrm>
+          <a:prstGeom prst="rect">
+            <a:avLst/>
+          </a:prstGeom>
+          <a:noFill/>
+        </p:spPr>
+        <p:txBody>
+          <a:bodyPr wrap="none" rtlCol="0">
+            <a:spAutoFit/>
+          </a:bodyPr>
+          <a:lstStyle/>
+          <a:p>
+            <a:r>
+              <a:rPr kumimoji="1" lang="en-US" altLang="ja-JP" b="1" dirty="0" smtClean="0"/>
+              <a:t>Executed motion</a:t>
+            </a:r>
+            <a:endParaRPr kumimoji="1" lang="ja-JP" altLang="en-US" b="1" dirty="0"/>
+          </a:p>
+        </p:txBody>
+      </p:sp>
+      <p:sp>
+        <p:nvSpPr>
+          <p:cNvPr id="34" name="正方形/長方形 33"/>
+          <p:cNvSpPr/>
+          <p:nvPr/>
+        </p:nvSpPr>
+        <p:spPr>
+          <a:xfrm>
+            <a:off x="8387708" y="1329721"/>
+            <a:ext cx="410363" cy="721936"/>
+          </a:xfrm>
+          <a:prstGeom prst="rect">
+            <a:avLst/>
+          </a:prstGeom>
+        </p:spPr>
+        <p:style>
+          <a:lnRef idx="2">
+            <a:schemeClr val="accent1">
+              <a:shade val="50000"/>
+            </a:schemeClr>
+          </a:lnRef>
+          <a:fillRef idx="1">
+            <a:schemeClr val="accent1"/>
+          </a:fillRef>
+          <a:effectRef idx="0">
+            <a:schemeClr val="accent1"/>
+          </a:effectRef>
+          <a:fontRef idx="minor">
+            <a:schemeClr val="lt1"/>
+          </a:fontRef>
+        </p:style>
+        <p:txBody>
+          <a:bodyPr rtlCol="0" anchor="ctr"/>
+          <a:lstStyle/>
+          <a:p>
+            <a:pPr algn="ctr"/>
+            <a:r>
+              <a:rPr lang="en-US" altLang="ja-JP" dirty="0"/>
+              <a:t>3</a:t>
+            </a:r>
+            <a:endParaRPr kumimoji="1" lang="ja-JP" altLang="en-US" dirty="0"/>
+          </a:p>
+        </p:txBody>
+      </p:sp>
+      <p:sp>
+        <p:nvSpPr>
+          <p:cNvPr id="39" name="正方形/長方形 38"/>
+          <p:cNvSpPr/>
+          <p:nvPr/>
+        </p:nvSpPr>
+        <p:spPr>
+          <a:xfrm>
+            <a:off x="7774819" y="1329721"/>
+            <a:ext cx="410363" cy="721936"/>
+          </a:xfrm>
+          <a:prstGeom prst="rect">
+            <a:avLst/>
+          </a:prstGeom>
+        </p:spPr>
+        <p:style>
+          <a:lnRef idx="2">
+            <a:schemeClr val="accent1">
+              <a:shade val="50000"/>
+            </a:schemeClr>
+          </a:lnRef>
+          <a:fillRef idx="1">
+            <a:schemeClr val="accent1"/>
+          </a:fillRef>
+          <a:effectRef idx="0">
+            <a:schemeClr val="accent1"/>
+          </a:effectRef>
+          <a:fontRef idx="minor">
+            <a:schemeClr val="lt1"/>
+          </a:fontRef>
+        </p:style>
+        <p:txBody>
+          <a:bodyPr rtlCol="0" anchor="ctr"/>
+          <a:lstStyle/>
+          <a:p>
+            <a:pPr algn="ctr"/>
+            <a:endParaRPr kumimoji="1" lang="ja-JP" altLang="en-US" dirty="0"/>
+          </a:p>
+        </p:txBody>
+      </p:sp>
+      <p:sp>
+        <p:nvSpPr>
+          <p:cNvPr id="40" name="円/楕円 39"/>
+          <p:cNvSpPr/>
+          <p:nvPr/>
+        </p:nvSpPr>
+        <p:spPr>
+          <a:xfrm>
+            <a:off x="3315906" y="2847721"/>
+            <a:ext cx="108284" cy="108284"/>
+          </a:xfrm>
+          <a:prstGeom prst="ellipse">
+            <a:avLst/>
+          </a:prstGeom>
+          <a:solidFill>
+            <a:schemeClr val="accent4">
+              <a:lumMod val="60000"/>
+              <a:lumOff val="40000"/>
+            </a:schemeClr>
+          </a:solidFill>
+          <a:ln>
+            <a:noFill/>
+          </a:ln>
+        </p:spPr>
+        <p:style>
+          <a:lnRef idx="2">
+            <a:schemeClr val="accent1">
+              <a:shade val="50000"/>
+            </a:schemeClr>
+          </a:lnRef>
+          <a:fillRef idx="1">
+            <a:schemeClr val="accent1"/>
+          </a:fillRef>
+          <a:effectRef idx="0">
+            <a:schemeClr val="accent1"/>
+          </a:effectRef>
+          <a:fontRef idx="minor">
+            <a:schemeClr val="lt1"/>
+          </a:fontRef>
+        </p:style>
+        <p:txBody>
+          <a:bodyPr rtlCol="0" anchor="ctr"/>
+          <a:lstStyle/>
+          <a:p>
+            <a:pPr algn="ctr"/>
+            <a:endParaRPr kumimoji="1" lang="ja-JP" altLang="en-US"/>
+          </a:p>
+        </p:txBody>
+      </p:sp>
+      <p:sp>
+        <p:nvSpPr>
+          <p:cNvPr id="41" name="円/楕円 40"/>
+          <p:cNvSpPr/>
+          <p:nvPr/>
+        </p:nvSpPr>
+        <p:spPr>
+          <a:xfrm>
+            <a:off x="4695522" y="2819645"/>
+            <a:ext cx="108284" cy="108284"/>
+          </a:xfrm>
+          <a:prstGeom prst="ellipse">
+            <a:avLst/>
+          </a:prstGeom>
+          <a:solidFill>
+            <a:schemeClr val="accent4">
+              <a:lumMod val="60000"/>
+              <a:lumOff val="40000"/>
+            </a:schemeClr>
+          </a:solidFill>
+          <a:ln>
+            <a:noFill/>
+          </a:ln>
+        </p:spPr>
+        <p:style>
+          <a:lnRef idx="2">
+            <a:schemeClr val="accent1">
+              <a:shade val="50000"/>
+            </a:schemeClr>
+          </a:lnRef>
+          <a:fillRef idx="1">
+            <a:schemeClr val="accent1"/>
+          </a:fillRef>
+          <a:effectRef idx="0">
+            <a:schemeClr val="accent1"/>
+          </a:effectRef>
+          <a:fontRef idx="minor">
+            <a:schemeClr val="lt1"/>
+          </a:fontRef>
+        </p:style>
+        <p:txBody>
+          <a:bodyPr rtlCol="0" anchor="ctr"/>
+          <a:lstStyle/>
+          <a:p>
+            <a:pPr algn="ctr"/>
+            <a:endParaRPr kumimoji="1" lang="ja-JP" altLang="en-US"/>
+          </a:p>
+        </p:txBody>
+      </p:sp>
+      <p:sp>
+        <p:nvSpPr>
+          <p:cNvPr id="42" name="円/楕円 41"/>
+          <p:cNvSpPr/>
+          <p:nvPr/>
+        </p:nvSpPr>
+        <p:spPr>
+          <a:xfrm>
+            <a:off x="6786586" y="1690689"/>
+            <a:ext cx="108284" cy="108284"/>
+          </a:xfrm>
+          <a:prstGeom prst="ellipse">
+            <a:avLst/>
+          </a:prstGeom>
+          <a:solidFill>
+            <a:schemeClr val="accent4">
+              <a:lumMod val="60000"/>
+              <a:lumOff val="40000"/>
+            </a:schemeClr>
+          </a:solidFill>
+          <a:ln>
+            <a:noFill/>
+          </a:ln>
+        </p:spPr>
+        <p:style>
+          <a:lnRef idx="2">
+            <a:schemeClr val="accent1">
+              <a:shade val="50000"/>
+            </a:schemeClr>
+          </a:lnRef>
+          <a:fillRef idx="1">
+            <a:schemeClr val="accent1"/>
+          </a:fillRef>
+          <a:effectRef idx="0">
+            <a:schemeClr val="accent1"/>
+          </a:effectRef>
+          <a:fontRef idx="minor">
+            <a:schemeClr val="lt1"/>
+          </a:fontRef>
+        </p:style>
+        <p:txBody>
+          <a:bodyPr rtlCol="0" anchor="ctr"/>
+          <a:lstStyle/>
+          <a:p>
+            <a:pPr algn="ctr"/>
+            <a:endParaRPr kumimoji="1" lang="ja-JP" altLang="en-US"/>
+          </a:p>
+        </p:txBody>
+      </p:sp>
+      <p:sp>
+        <p:nvSpPr>
+          <p:cNvPr id="43" name="円/楕円 42"/>
+          <p:cNvSpPr/>
+          <p:nvPr/>
+        </p:nvSpPr>
+        <p:spPr>
+          <a:xfrm>
+            <a:off x="8220092" y="1643279"/>
+            <a:ext cx="108284" cy="108284"/>
+          </a:xfrm>
+          <a:prstGeom prst="ellipse">
+            <a:avLst/>
+          </a:prstGeom>
+          <a:solidFill>
+            <a:schemeClr val="accent4">
+              <a:lumMod val="60000"/>
+              <a:lumOff val="40000"/>
+            </a:schemeClr>
+          </a:solidFill>
+          <a:ln>
+            <a:noFill/>
+          </a:ln>
+        </p:spPr>
+        <p:style>
+          <a:lnRef idx="2">
+            <a:schemeClr val="accent1">
+              <a:shade val="50000"/>
+            </a:schemeClr>
+          </a:lnRef>
+          <a:fillRef idx="1">
+            <a:schemeClr val="accent1"/>
+          </a:fillRef>
+          <a:effectRef idx="0">
+            <a:schemeClr val="accent1"/>
+          </a:effectRef>
+          <a:fontRef idx="minor">
+            <a:schemeClr val="lt1"/>
+          </a:fontRef>
+        </p:style>
+        <p:txBody>
+          <a:bodyPr rtlCol="0" anchor="ctr"/>
+          <a:lstStyle/>
+          <a:p>
+            <a:pPr algn="ctr"/>
+            <a:endParaRPr kumimoji="1" lang="ja-JP" altLang="en-US"/>
+          </a:p>
+        </p:txBody>
+      </p:sp>
+      <p:sp>
+        <p:nvSpPr>
+          <p:cNvPr id="45" name="円/楕円 44"/>
+          <p:cNvSpPr/>
+          <p:nvPr/>
+        </p:nvSpPr>
+        <p:spPr>
+          <a:xfrm>
+            <a:off x="7768320" y="267698"/>
+            <a:ext cx="108284" cy="108284"/>
+          </a:xfrm>
+          <a:prstGeom prst="ellipse">
+            <a:avLst/>
+          </a:prstGeom>
+          <a:solidFill>
+            <a:schemeClr val="accent4">
+              <a:lumMod val="60000"/>
+              <a:lumOff val="40000"/>
+            </a:schemeClr>
+          </a:solidFill>
+          <a:ln>
+            <a:noFill/>
+          </a:ln>
+        </p:spPr>
+        <p:style>
+          <a:lnRef idx="2">
+            <a:schemeClr val="accent1">
+              <a:shade val="50000"/>
+            </a:schemeClr>
+          </a:lnRef>
+          <a:fillRef idx="1">
+            <a:schemeClr val="accent1"/>
+          </a:fillRef>
+          <a:effectRef idx="0">
+            <a:schemeClr val="accent1"/>
+          </a:effectRef>
+          <a:fontRef idx="minor">
+            <a:schemeClr val="lt1"/>
+          </a:fontRef>
+        </p:style>
+        <p:txBody>
+          <a:bodyPr rtlCol="0" anchor="ctr"/>
+          <a:lstStyle/>
+          <a:p>
+            <a:pPr algn="ctr"/>
+            <a:endParaRPr kumimoji="1" lang="ja-JP" altLang="en-US"/>
+          </a:p>
+        </p:txBody>
+      </p:sp>
+      <p:sp>
+        <p:nvSpPr>
+          <p:cNvPr id="46" name="テキスト ボックス 45"/>
+          <p:cNvSpPr txBox="1"/>
+          <p:nvPr/>
+        </p:nvSpPr>
+        <p:spPr>
+          <a:xfrm>
+            <a:off x="7842975" y="106391"/>
+            <a:ext cx="1089465" cy="369332"/>
+          </a:xfrm>
+          <a:prstGeom prst="rect">
+            <a:avLst/>
+          </a:prstGeom>
+          <a:noFill/>
+        </p:spPr>
+        <p:txBody>
+          <a:bodyPr wrap="none" rtlCol="0">
+            <a:spAutoFit/>
+          </a:bodyPr>
+          <a:lstStyle/>
+          <a:p>
+            <a:r>
+              <a:rPr lang="en-US" altLang="ja-JP" dirty="0"/>
+              <a:t> </a:t>
+            </a:r>
+            <a:r>
+              <a:rPr lang="en-US" altLang="ja-JP" dirty="0" smtClean="0"/>
+              <a:t>is </a:t>
+            </a:r>
+            <a:r>
+              <a:rPr lang="en-US" altLang="ja-JP" dirty="0" err="1" smtClean="0"/>
+              <a:t>refzmp</a:t>
+            </a:r>
+            <a:endParaRPr kumimoji="1" lang="ja-JP" altLang="en-US" dirty="0"/>
+          </a:p>
+        </p:txBody>
+      </p:sp>
+      <p:sp>
+        <p:nvSpPr>
+          <p:cNvPr id="47" name="テキスト ボックス 46"/>
+          <p:cNvSpPr txBox="1"/>
+          <p:nvPr/>
+        </p:nvSpPr>
+        <p:spPr>
+          <a:xfrm>
+            <a:off x="4939708" y="2106235"/>
+            <a:ext cx="722121" cy="369332"/>
+          </a:xfrm>
+          <a:prstGeom prst="rect">
+            <a:avLst/>
+          </a:prstGeom>
+          <a:noFill/>
+        </p:spPr>
+        <p:txBody>
+          <a:bodyPr wrap="none" rtlCol="0">
+            <a:spAutoFit/>
+          </a:bodyPr>
+          <a:lstStyle/>
+          <a:p>
+            <a:r>
+              <a:rPr lang="en-US" altLang="ja-JP" dirty="0" smtClean="0"/>
+              <a:t>swing</a:t>
+            </a:r>
+            <a:endParaRPr kumimoji="1" lang="ja-JP" altLang="en-US" dirty="0"/>
+          </a:p>
+        </p:txBody>
+      </p:sp>
+      <p:sp>
+        <p:nvSpPr>
+          <p:cNvPr id="48" name="テキスト ボックス 47"/>
+          <p:cNvSpPr txBox="1"/>
+          <p:nvPr/>
+        </p:nvSpPr>
+        <p:spPr>
+          <a:xfrm>
+            <a:off x="5913426" y="2115409"/>
+            <a:ext cx="722121" cy="369332"/>
+          </a:xfrm>
+          <a:prstGeom prst="rect">
+            <a:avLst/>
+          </a:prstGeom>
+          <a:noFill/>
+        </p:spPr>
+        <p:txBody>
+          <a:bodyPr wrap="none" rtlCol="0">
+            <a:spAutoFit/>
+          </a:bodyPr>
+          <a:lstStyle/>
+          <a:p>
+            <a:r>
+              <a:rPr lang="en-US" altLang="ja-JP" dirty="0" smtClean="0"/>
+              <a:t>swing</a:t>
+            </a:r>
+            <a:endParaRPr kumimoji="1" lang="ja-JP" altLang="en-US" dirty="0"/>
+          </a:p>
+        </p:txBody>
+      </p:sp>
+      <p:sp>
+        <p:nvSpPr>
+          <p:cNvPr id="10" name="テキスト ボックス 9"/>
+          <p:cNvSpPr txBox="1"/>
+          <p:nvPr/>
+        </p:nvSpPr>
+        <p:spPr>
+          <a:xfrm>
+            <a:off x="105000" y="4069805"/>
+            <a:ext cx="2312556" cy="646331"/>
+          </a:xfrm>
+          <a:prstGeom prst="rect">
+            <a:avLst/>
+          </a:prstGeom>
+          <a:noFill/>
+        </p:spPr>
+        <p:txBody>
+          <a:bodyPr wrap="none" rtlCol="0">
+            <a:spAutoFit/>
+          </a:bodyPr>
+          <a:lstStyle/>
+          <a:p>
+            <a:r>
+              <a:rPr lang="en-US" altLang="ja-JP" i="1" dirty="0" err="1" smtClean="0"/>
+              <a:t>lcg.get_f</a:t>
+            </a:r>
+            <a:r>
+              <a:rPr kumimoji="1" lang="en-US" altLang="ja-JP" i="1" dirty="0" err="1" smtClean="0"/>
+              <a:t>ootstep_index</a:t>
+            </a:r>
+            <a:endParaRPr kumimoji="1" lang="en-US" altLang="ja-JP" i="1" dirty="0" smtClean="0"/>
+          </a:p>
+          <a:p>
+            <a:pPr algn="ctr"/>
+            <a:r>
+              <a:rPr lang="en-US" altLang="ja-JP" dirty="0" smtClean="0"/>
+              <a:t>(current fs)</a:t>
+            </a:r>
+            <a:endParaRPr kumimoji="1" lang="ja-JP" altLang="en-US" dirty="0"/>
+          </a:p>
+        </p:txBody>
+      </p:sp>
+      <p:cxnSp>
+        <p:nvCxnSpPr>
+          <p:cNvPr id="12" name="直線矢印コネクタ 11"/>
+          <p:cNvCxnSpPr/>
+          <p:nvPr/>
+        </p:nvCxnSpPr>
+        <p:spPr>
+          <a:xfrm>
+            <a:off x="2818947" y="3478597"/>
+            <a:ext cx="6113493" cy="0"/>
+          </a:xfrm>
+          <a:prstGeom prst="straightConnector1">
+            <a:avLst/>
+          </a:prstGeom>
+          <a:ln>
+            <a:tailEnd type="triangle"/>
+          </a:ln>
+        </p:spPr>
+        <p:style>
+          <a:lnRef idx="1">
+            <a:schemeClr val="accent1"/>
+          </a:lnRef>
+          <a:fillRef idx="0">
+            <a:schemeClr val="accent1"/>
+          </a:fillRef>
+          <a:effectRef idx="0">
+            <a:schemeClr val="accent1"/>
+          </a:effectRef>
+          <a:fontRef idx="minor">
+            <a:schemeClr val="tx1"/>
+          </a:fontRef>
+        </p:style>
+      </p:cxnSp>
+      <p:sp>
+        <p:nvSpPr>
+          <p:cNvPr id="13" name="テキスト ボックス 12"/>
+          <p:cNvSpPr txBox="1"/>
+          <p:nvPr/>
+        </p:nvSpPr>
+        <p:spPr>
+          <a:xfrm>
+            <a:off x="3219205" y="4112296"/>
+            <a:ext cx="301686" cy="369332"/>
+          </a:xfrm>
+          <a:prstGeom prst="rect">
+            <a:avLst/>
+          </a:prstGeom>
+          <a:noFill/>
+        </p:spPr>
+        <p:txBody>
+          <a:bodyPr wrap="none" rtlCol="0">
+            <a:spAutoFit/>
+          </a:bodyPr>
+          <a:lstStyle/>
+          <a:p>
+            <a:r>
+              <a:rPr kumimoji="1" lang="en-US" altLang="ja-JP" dirty="0" smtClean="0"/>
+              <a:t>0</a:t>
+            </a:r>
+            <a:endParaRPr kumimoji="1" lang="ja-JP" altLang="en-US" dirty="0"/>
+          </a:p>
+        </p:txBody>
+      </p:sp>
+      <p:sp>
+        <p:nvSpPr>
+          <p:cNvPr id="49" name="テキスト ボックス 48"/>
+          <p:cNvSpPr txBox="1"/>
+          <p:nvPr/>
+        </p:nvSpPr>
+        <p:spPr>
+          <a:xfrm>
+            <a:off x="4962284" y="4106572"/>
+            <a:ext cx="301686" cy="369332"/>
+          </a:xfrm>
+          <a:prstGeom prst="rect">
+            <a:avLst/>
+          </a:prstGeom>
+          <a:noFill/>
+        </p:spPr>
+        <p:txBody>
+          <a:bodyPr wrap="none" rtlCol="0">
+            <a:spAutoFit/>
+          </a:bodyPr>
+          <a:lstStyle/>
+          <a:p>
+            <a:r>
+              <a:rPr lang="en-US" altLang="ja-JP" dirty="0"/>
+              <a:t>1</a:t>
+            </a:r>
+            <a:endParaRPr kumimoji="1" lang="ja-JP" altLang="en-US" dirty="0"/>
+          </a:p>
+        </p:txBody>
+      </p:sp>
+      <p:sp>
+        <p:nvSpPr>
+          <p:cNvPr id="50" name="テキスト ボックス 49"/>
+          <p:cNvSpPr txBox="1"/>
+          <p:nvPr/>
+        </p:nvSpPr>
+        <p:spPr>
+          <a:xfrm>
+            <a:off x="6477962" y="4069805"/>
+            <a:ext cx="301686" cy="369332"/>
+          </a:xfrm>
+          <a:prstGeom prst="rect">
+            <a:avLst/>
+          </a:prstGeom>
+          <a:noFill/>
+        </p:spPr>
+        <p:txBody>
+          <a:bodyPr wrap="none" rtlCol="0">
+            <a:spAutoFit/>
+          </a:bodyPr>
+          <a:lstStyle/>
+          <a:p>
+            <a:r>
+              <a:rPr lang="en-US" altLang="ja-JP" dirty="0"/>
+              <a:t>2</a:t>
+            </a:r>
+            <a:endParaRPr kumimoji="1" lang="ja-JP" altLang="en-US" dirty="0"/>
+          </a:p>
+        </p:txBody>
+      </p:sp>
+      <p:sp>
+        <p:nvSpPr>
+          <p:cNvPr id="51" name="テキスト ボックス 50"/>
+          <p:cNvSpPr txBox="1"/>
+          <p:nvPr/>
+        </p:nvSpPr>
+        <p:spPr>
+          <a:xfrm>
+            <a:off x="8143268" y="4069805"/>
+            <a:ext cx="555564" cy="369332"/>
+          </a:xfrm>
+          <a:prstGeom prst="rect">
+            <a:avLst/>
+          </a:prstGeom>
+          <a:noFill/>
+        </p:spPr>
+        <p:txBody>
+          <a:bodyPr wrap="square" rtlCol="0">
+            <a:spAutoFit/>
+          </a:bodyPr>
+          <a:lstStyle/>
+          <a:p>
+            <a:r>
+              <a:rPr lang="en-US" altLang="ja-JP" dirty="0" smtClean="0"/>
+              <a:t>(2)</a:t>
+            </a:r>
+            <a:endParaRPr kumimoji="1" lang="ja-JP" altLang="en-US" dirty="0"/>
+          </a:p>
+        </p:txBody>
+      </p:sp>
+      <p:sp>
+        <p:nvSpPr>
+          <p:cNvPr id="52" name="テキスト ボックス 51"/>
+          <p:cNvSpPr txBox="1"/>
+          <p:nvPr/>
+        </p:nvSpPr>
+        <p:spPr>
+          <a:xfrm>
+            <a:off x="95690" y="4715705"/>
+            <a:ext cx="1618905" cy="369332"/>
+          </a:xfrm>
+          <a:prstGeom prst="rect">
+            <a:avLst/>
+          </a:prstGeom>
+          <a:noFill/>
+        </p:spPr>
+        <p:txBody>
+          <a:bodyPr wrap="none" rtlCol="0">
+            <a:spAutoFit/>
+          </a:bodyPr>
+          <a:lstStyle/>
+          <a:p>
+            <a:r>
+              <a:rPr lang="en-US" altLang="ja-JP" dirty="0" err="1" smtClean="0"/>
+              <a:t>Overwritable</a:t>
+            </a:r>
+            <a:r>
+              <a:rPr lang="en-US" altLang="ja-JP" dirty="0" smtClean="0"/>
+              <a:t> fs</a:t>
+            </a:r>
+            <a:endParaRPr kumimoji="1" lang="ja-JP" altLang="en-US" dirty="0"/>
+          </a:p>
+        </p:txBody>
+      </p:sp>
+      <p:sp>
+        <p:nvSpPr>
+          <p:cNvPr id="53" name="テキスト ボックス 52"/>
+          <p:cNvSpPr txBox="1"/>
+          <p:nvPr/>
+        </p:nvSpPr>
+        <p:spPr>
+          <a:xfrm>
+            <a:off x="3219205" y="4661068"/>
+            <a:ext cx="417102" cy="369332"/>
+          </a:xfrm>
+          <a:prstGeom prst="rect">
+            <a:avLst/>
+          </a:prstGeom>
+          <a:noFill/>
+        </p:spPr>
+        <p:txBody>
+          <a:bodyPr wrap="none" rtlCol="0">
+            <a:spAutoFit/>
+          </a:bodyPr>
+          <a:lstStyle/>
+          <a:p>
+            <a:r>
+              <a:rPr lang="en-US" altLang="ja-JP" dirty="0" smtClean="0"/>
+              <a:t>1~</a:t>
+            </a:r>
+            <a:endParaRPr kumimoji="1" lang="ja-JP" altLang="en-US" dirty="0"/>
+          </a:p>
+        </p:txBody>
+      </p:sp>
+      <p:sp>
+        <p:nvSpPr>
+          <p:cNvPr id="54" name="テキスト ボックス 53"/>
+          <p:cNvSpPr txBox="1"/>
+          <p:nvPr/>
+        </p:nvSpPr>
+        <p:spPr>
+          <a:xfrm>
+            <a:off x="4962284" y="4655344"/>
+            <a:ext cx="417102" cy="369332"/>
+          </a:xfrm>
+          <a:prstGeom prst="rect">
+            <a:avLst/>
+          </a:prstGeom>
+          <a:noFill/>
+        </p:spPr>
+        <p:txBody>
+          <a:bodyPr wrap="none" rtlCol="0">
+            <a:spAutoFit/>
+          </a:bodyPr>
+          <a:lstStyle/>
+          <a:p>
+            <a:r>
+              <a:rPr lang="en-US" altLang="ja-JP" dirty="0" smtClean="0"/>
+              <a:t>2~</a:t>
+            </a:r>
+            <a:endParaRPr kumimoji="1" lang="ja-JP" altLang="en-US" dirty="0"/>
+          </a:p>
+        </p:txBody>
+      </p:sp>
+      <p:sp>
+        <p:nvSpPr>
+          <p:cNvPr id="55" name="テキスト ボックス 54"/>
+          <p:cNvSpPr txBox="1"/>
+          <p:nvPr/>
+        </p:nvSpPr>
+        <p:spPr>
+          <a:xfrm>
+            <a:off x="6477962" y="4618577"/>
+            <a:ext cx="255198" cy="369332"/>
+          </a:xfrm>
+          <a:prstGeom prst="rect">
+            <a:avLst/>
+          </a:prstGeom>
+          <a:noFill/>
+        </p:spPr>
+        <p:txBody>
+          <a:bodyPr wrap="none" rtlCol="0">
+            <a:spAutoFit/>
+          </a:bodyPr>
+          <a:lstStyle/>
+          <a:p>
+            <a:r>
+              <a:rPr lang="en-US" altLang="ja-JP" dirty="0" smtClean="0"/>
+              <a:t>-</a:t>
+            </a:r>
+            <a:endParaRPr kumimoji="1" lang="ja-JP" altLang="en-US" dirty="0"/>
+          </a:p>
+        </p:txBody>
+      </p:sp>
+      <p:sp>
+        <p:nvSpPr>
+          <p:cNvPr id="56" name="テキスト ボックス 55"/>
+          <p:cNvSpPr txBox="1"/>
+          <p:nvPr/>
+        </p:nvSpPr>
+        <p:spPr>
+          <a:xfrm>
+            <a:off x="8143268" y="4618577"/>
+            <a:ext cx="555564" cy="369332"/>
+          </a:xfrm>
+          <a:prstGeom prst="rect">
+            <a:avLst/>
+          </a:prstGeom>
+          <a:noFill/>
+        </p:spPr>
+        <p:txBody>
+          <a:bodyPr wrap="square" rtlCol="0">
+            <a:spAutoFit/>
+          </a:bodyPr>
+          <a:lstStyle/>
+          <a:p>
+            <a:r>
+              <a:rPr lang="en-US" altLang="ja-JP" dirty="0" smtClean="0"/>
+              <a:t>-</a:t>
+            </a:r>
+            <a:endParaRPr kumimoji="1" lang="ja-JP" altLang="en-US" dirty="0"/>
+          </a:p>
+        </p:txBody>
+      </p:sp>
+      <p:sp>
+        <p:nvSpPr>
+          <p:cNvPr id="57" name="テキスト ボックス 56"/>
+          <p:cNvSpPr txBox="1"/>
+          <p:nvPr/>
+        </p:nvSpPr>
+        <p:spPr>
+          <a:xfrm>
+            <a:off x="95690" y="5286343"/>
+            <a:ext cx="2627001" cy="307777"/>
+          </a:xfrm>
+          <a:prstGeom prst="rect">
+            <a:avLst/>
+          </a:prstGeom>
+          <a:noFill/>
+        </p:spPr>
+        <p:txBody>
+          <a:bodyPr wrap="none" rtlCol="0">
+            <a:spAutoFit/>
+          </a:bodyPr>
+          <a:lstStyle/>
+          <a:p>
+            <a:r>
+              <a:rPr lang="en-US" altLang="ja-JP" sz="1400" i="1" dirty="0" err="1" smtClean="0"/>
+              <a:t>getRemainingFootstepSequence</a:t>
+            </a:r>
+            <a:r>
+              <a:rPr lang="en-US" altLang="ja-JP" sz="1400" i="1" dirty="0" smtClean="0"/>
+              <a:t>()</a:t>
+            </a:r>
+            <a:endParaRPr kumimoji="1" lang="ja-JP" altLang="en-US" sz="1400" i="1" dirty="0"/>
+          </a:p>
+        </p:txBody>
+      </p:sp>
+      <p:sp>
+        <p:nvSpPr>
+          <p:cNvPr id="58" name="テキスト ボックス 57"/>
+          <p:cNvSpPr txBox="1"/>
+          <p:nvPr/>
+        </p:nvSpPr>
+        <p:spPr>
+          <a:xfrm>
+            <a:off x="3068710" y="5225982"/>
+            <a:ext cx="966931" cy="369332"/>
+          </a:xfrm>
+          <a:prstGeom prst="rect">
+            <a:avLst/>
+          </a:prstGeom>
+          <a:noFill/>
+        </p:spPr>
+        <p:txBody>
+          <a:bodyPr wrap="none" rtlCol="0">
+            <a:spAutoFit/>
+          </a:bodyPr>
+          <a:lstStyle/>
+          <a:p>
+            <a:r>
+              <a:rPr kumimoji="1" lang="en-US" altLang="ja-JP" dirty="0" smtClean="0"/>
+              <a:t>[0,1,2,3]</a:t>
+            </a:r>
+            <a:endParaRPr kumimoji="1" lang="ja-JP" altLang="en-US" dirty="0"/>
+          </a:p>
+        </p:txBody>
+      </p:sp>
+      <p:sp>
+        <p:nvSpPr>
+          <p:cNvPr id="59" name="テキスト ボックス 58"/>
+          <p:cNvSpPr txBox="1"/>
+          <p:nvPr/>
+        </p:nvSpPr>
+        <p:spPr>
+          <a:xfrm>
+            <a:off x="4962284" y="5225982"/>
+            <a:ext cx="792205" cy="369332"/>
+          </a:xfrm>
+          <a:prstGeom prst="rect">
+            <a:avLst/>
+          </a:prstGeom>
+          <a:noFill/>
+        </p:spPr>
+        <p:txBody>
+          <a:bodyPr wrap="none" rtlCol="0">
+            <a:spAutoFit/>
+          </a:bodyPr>
+          <a:lstStyle/>
+          <a:p>
+            <a:r>
+              <a:rPr lang="en-US" altLang="ja-JP" dirty="0" smtClean="0"/>
+              <a:t>[1,2,3]</a:t>
+            </a:r>
+            <a:endParaRPr kumimoji="1" lang="ja-JP" altLang="en-US" dirty="0"/>
+          </a:p>
+        </p:txBody>
+      </p:sp>
+      <p:sp>
+        <p:nvSpPr>
+          <p:cNvPr id="60" name="テキスト ボックス 59"/>
+          <p:cNvSpPr txBox="1"/>
+          <p:nvPr/>
+        </p:nvSpPr>
+        <p:spPr>
+          <a:xfrm>
+            <a:off x="6477962" y="5189215"/>
+            <a:ext cx="617477" cy="369332"/>
+          </a:xfrm>
+          <a:prstGeom prst="rect">
+            <a:avLst/>
+          </a:prstGeom>
+          <a:noFill/>
+        </p:spPr>
+        <p:txBody>
+          <a:bodyPr wrap="none" rtlCol="0">
+            <a:spAutoFit/>
+          </a:bodyPr>
+          <a:lstStyle/>
+          <a:p>
+            <a:r>
+              <a:rPr lang="en-US" altLang="ja-JP" dirty="0" smtClean="0"/>
+              <a:t>[2,3]</a:t>
+            </a:r>
+            <a:endParaRPr kumimoji="1" lang="ja-JP" altLang="en-US" dirty="0"/>
+          </a:p>
+        </p:txBody>
+      </p:sp>
+      <p:sp>
+        <p:nvSpPr>
+          <p:cNvPr id="61" name="テキスト ボックス 60"/>
+          <p:cNvSpPr txBox="1"/>
+          <p:nvPr/>
+        </p:nvSpPr>
+        <p:spPr>
+          <a:xfrm>
+            <a:off x="8143268" y="5189215"/>
+            <a:ext cx="555564" cy="369332"/>
+          </a:xfrm>
+          <a:prstGeom prst="rect">
+            <a:avLst/>
+          </a:prstGeom>
+          <a:noFill/>
+        </p:spPr>
+        <p:txBody>
+          <a:bodyPr wrap="square" rtlCol="0">
+            <a:spAutoFit/>
+          </a:bodyPr>
+          <a:lstStyle/>
+          <a:p>
+            <a:r>
+              <a:rPr lang="en-US" altLang="ja-JP" dirty="0" smtClean="0"/>
+              <a:t>[3]</a:t>
+            </a:r>
+            <a:endParaRPr kumimoji="1" lang="ja-JP" altLang="en-US" dirty="0"/>
+          </a:p>
+        </p:txBody>
+      </p:sp>
+    </p:spTree>
+    <p:extLst>
+      <p:ext uri="{BB962C8B-B14F-4D97-AF65-F5344CB8AC3E}">
+        <p14:creationId xmlns:p14="http://schemas.microsoft.com/office/powerpoint/2010/main" val="2170018373"/>
+      </p:ext>
+    </p:extLst>
+  </p:cSld>
+  <p:clrMapOvr>
+    <a:masterClrMapping/>
+  </p:clrMapOvr>
+  <p:timing>
+    <p:tnLst>
+      <p:par>
+        <p:cTn id="1" dur="indefinite" restart="never" nodeType="tmRoot"/>
+      </p:par>
+    </p:tnLst>
+  </p:timing>
+</p:sld>
+</file>
+
+<file path=ppt/slides/slide13.xml><?xml version="1.0" encoding="utf-8"?>
+<p:sld xmlns:a="http://schemas.openxmlformats.org/drawingml/2006/main" xmlns:r="http://schemas.openxmlformats.org/officeDocument/2006/relationships" xmlns:p="http://schemas.openxmlformats.org/presentationml/2006/main">
+  <p:cSld>
+    <p:spTree>
+      <p:nvGrpSpPr>
+        <p:cNvPr id="1" name=""/>
+        <p:cNvGrpSpPr/>
+        <p:nvPr/>
+      </p:nvGrpSpPr>
+      <p:grpSpPr>
+        <a:xfrm>
+          <a:off x="0" y="0"/>
+          <a:ext cx="0" cy="0"/>
+          <a:chOff x="0" y="0"/>
+          <a:chExt cx="0" cy="0"/>
+        </a:xfrm>
+      </p:grpSpPr>
+      <p:sp>
+        <p:nvSpPr>
+          <p:cNvPr id="2" name="タイトル 1"/>
+          <p:cNvSpPr>
+            <a:spLocks noGrp="1"/>
+          </p:cNvSpPr>
+          <p:nvPr>
+            <p:ph type="title"/>
+          </p:nvPr>
+        </p:nvSpPr>
+        <p:spPr>
+          <a:xfrm>
+            <a:off x="441676" y="-234446"/>
+            <a:ext cx="7886700" cy="1325563"/>
+          </a:xfrm>
+        </p:spPr>
+        <p:txBody>
+          <a:bodyPr/>
+          <a:lstStyle/>
+          <a:p>
+            <a:r>
+              <a:rPr kumimoji="1" lang="en-US" altLang="ja-JP" dirty="0" smtClean="0"/>
+              <a:t>How to overwrite footsteps?</a:t>
+            </a:r>
+            <a:endParaRPr kumimoji="1" lang="ja-JP" altLang="en-US" dirty="0"/>
+          </a:p>
+        </p:txBody>
+      </p:sp>
+      <p:sp>
+        <p:nvSpPr>
+          <p:cNvPr id="4" name="正方形/長方形 3"/>
+          <p:cNvSpPr/>
+          <p:nvPr/>
+        </p:nvSpPr>
+        <p:spPr>
+          <a:xfrm>
+            <a:off x="423468" y="2756661"/>
+            <a:ext cx="410363" cy="721936"/>
+          </a:xfrm>
+          <a:prstGeom prst="rect">
+            <a:avLst/>
+          </a:prstGeom>
+        </p:spPr>
+        <p:style>
+          <a:lnRef idx="2">
+            <a:schemeClr val="accent1">
+              <a:shade val="50000"/>
+            </a:schemeClr>
+          </a:lnRef>
+          <a:fillRef idx="1">
+            <a:schemeClr val="accent1"/>
+          </a:fillRef>
+          <a:effectRef idx="0">
+            <a:schemeClr val="accent1"/>
+          </a:effectRef>
+          <a:fontRef idx="minor">
+            <a:schemeClr val="lt1"/>
+          </a:fontRef>
+        </p:style>
+        <p:txBody>
+          <a:bodyPr rtlCol="0" anchor="ctr"/>
+          <a:lstStyle/>
+          <a:p>
+            <a:pPr algn="ctr"/>
+            <a:r>
+              <a:rPr lang="en-US" altLang="ja-JP" sz="1400" dirty="0" smtClean="0"/>
+              <a:t>i-1</a:t>
+            </a:r>
+            <a:endParaRPr kumimoji="1" lang="ja-JP" altLang="en-US" sz="1400" dirty="0"/>
+          </a:p>
+        </p:txBody>
+      </p:sp>
+      <p:sp>
+        <p:nvSpPr>
+          <p:cNvPr id="5" name="正方形/長方形 4"/>
+          <p:cNvSpPr/>
+          <p:nvPr/>
+        </p:nvSpPr>
+        <p:spPr>
+          <a:xfrm>
+            <a:off x="1116150" y="2154104"/>
+            <a:ext cx="410363" cy="721936"/>
+          </a:xfrm>
+          <a:prstGeom prst="rect">
+            <a:avLst/>
+          </a:prstGeom>
+          <a:noFill/>
+          <a:ln>
+            <a:prstDash val="dash"/>
+          </a:ln>
+        </p:spPr>
+        <p:style>
+          <a:lnRef idx="2">
+            <a:schemeClr val="accent1">
+              <a:shade val="50000"/>
+            </a:schemeClr>
+          </a:lnRef>
+          <a:fillRef idx="1">
+            <a:schemeClr val="accent1"/>
+          </a:fillRef>
+          <a:effectRef idx="0">
+            <a:schemeClr val="accent1"/>
+          </a:effectRef>
+          <a:fontRef idx="minor">
+            <a:schemeClr val="lt1"/>
+          </a:fontRef>
+        </p:style>
+        <p:txBody>
+          <a:bodyPr rtlCol="0" anchor="ctr"/>
+          <a:lstStyle/>
+          <a:p>
+            <a:pPr algn="ctr"/>
+            <a:r>
+              <a:rPr lang="en-US" altLang="ja-JP" sz="1400" dirty="0" err="1" smtClean="0">
+                <a:solidFill>
+                  <a:schemeClr val="tx1"/>
+                </a:solidFill>
+              </a:rPr>
+              <a:t>i</a:t>
+            </a:r>
+            <a:endParaRPr kumimoji="1" lang="ja-JP" altLang="en-US" sz="1400" dirty="0">
+              <a:solidFill>
+                <a:schemeClr val="tx1"/>
+              </a:solidFill>
+            </a:endParaRPr>
+          </a:p>
+        </p:txBody>
+      </p:sp>
+      <p:sp>
+        <p:nvSpPr>
+          <p:cNvPr id="7" name="正方形/長方形 6"/>
+          <p:cNvSpPr/>
+          <p:nvPr/>
+        </p:nvSpPr>
+        <p:spPr>
+          <a:xfrm>
+            <a:off x="423468" y="1570119"/>
+            <a:ext cx="410363" cy="721936"/>
+          </a:xfrm>
+          <a:prstGeom prst="rect">
+            <a:avLst/>
+          </a:prstGeom>
+          <a:noFill/>
+          <a:ln>
+            <a:prstDash val="dash"/>
+          </a:ln>
+        </p:spPr>
+        <p:style>
+          <a:lnRef idx="2">
+            <a:schemeClr val="accent1">
+              <a:shade val="50000"/>
+            </a:schemeClr>
+          </a:lnRef>
+          <a:fillRef idx="1">
+            <a:schemeClr val="accent1"/>
+          </a:fillRef>
+          <a:effectRef idx="0">
+            <a:schemeClr val="accent1"/>
+          </a:effectRef>
+          <a:fontRef idx="minor">
+            <a:schemeClr val="lt1"/>
+          </a:fontRef>
+        </p:style>
+        <p:txBody>
+          <a:bodyPr rtlCol="0" anchor="ctr"/>
+          <a:lstStyle/>
+          <a:p>
+            <a:pPr algn="ctr"/>
+            <a:r>
+              <a:rPr lang="en-US" altLang="ja-JP" sz="1400" dirty="0" smtClean="0">
+                <a:solidFill>
+                  <a:schemeClr val="tx1"/>
+                </a:solidFill>
+              </a:rPr>
+              <a:t>i+1</a:t>
+            </a:r>
+            <a:endParaRPr kumimoji="1" lang="ja-JP" altLang="en-US" sz="1400" dirty="0">
+              <a:solidFill>
+                <a:schemeClr val="tx1"/>
+              </a:solidFill>
+            </a:endParaRPr>
+          </a:p>
+        </p:txBody>
+      </p:sp>
+      <p:sp>
+        <p:nvSpPr>
+          <p:cNvPr id="8" name="正方形/長方形 7"/>
+          <p:cNvSpPr/>
+          <p:nvPr/>
+        </p:nvSpPr>
+        <p:spPr>
+          <a:xfrm>
+            <a:off x="1116149" y="1003732"/>
+            <a:ext cx="410363" cy="721936"/>
+          </a:xfrm>
+          <a:prstGeom prst="rect">
+            <a:avLst/>
+          </a:prstGeom>
+          <a:noFill/>
+          <a:ln>
+            <a:prstDash val="dash"/>
+          </a:ln>
+        </p:spPr>
+        <p:style>
+          <a:lnRef idx="2">
+            <a:schemeClr val="accent1">
+              <a:shade val="50000"/>
+            </a:schemeClr>
+          </a:lnRef>
+          <a:fillRef idx="1">
+            <a:schemeClr val="accent1"/>
+          </a:fillRef>
+          <a:effectRef idx="0">
+            <a:schemeClr val="accent1"/>
+          </a:effectRef>
+          <a:fontRef idx="minor">
+            <a:schemeClr val="lt1"/>
+          </a:fontRef>
+        </p:style>
+        <p:txBody>
+          <a:bodyPr rtlCol="0" anchor="ctr"/>
+          <a:lstStyle/>
+          <a:p>
+            <a:pPr algn="ctr"/>
+            <a:r>
+              <a:rPr lang="en-US" altLang="ja-JP" sz="1400" dirty="0" smtClean="0">
+                <a:solidFill>
+                  <a:schemeClr val="tx1"/>
+                </a:solidFill>
+              </a:rPr>
+              <a:t>i+2</a:t>
+            </a:r>
+          </a:p>
+        </p:txBody>
+      </p:sp>
+      <p:sp>
+        <p:nvSpPr>
+          <p:cNvPr id="62" name="テキスト ボックス 61"/>
+          <p:cNvSpPr txBox="1"/>
+          <p:nvPr/>
+        </p:nvSpPr>
+        <p:spPr>
+          <a:xfrm>
+            <a:off x="982118" y="2832837"/>
+            <a:ext cx="1552541" cy="523220"/>
+          </a:xfrm>
+          <a:prstGeom prst="rect">
+            <a:avLst/>
+          </a:prstGeom>
+          <a:noFill/>
+        </p:spPr>
+        <p:txBody>
+          <a:bodyPr wrap="none" rtlCol="0">
+            <a:spAutoFit/>
+          </a:bodyPr>
+          <a:lstStyle/>
+          <a:p>
+            <a:r>
+              <a:rPr lang="en-US" altLang="ja-JP" sz="1400" dirty="0" smtClean="0"/>
+              <a:t>Current </a:t>
+            </a:r>
+            <a:r>
+              <a:rPr lang="en-US" altLang="ja-JP" sz="1400" dirty="0" smtClean="0"/>
+              <a:t>fs</a:t>
+            </a:r>
+            <a:r>
+              <a:rPr lang="ja-JP" altLang="en-US" sz="1400" dirty="0"/>
+              <a:t> </a:t>
+            </a:r>
+            <a:r>
+              <a:rPr lang="en-US" altLang="ja-JP" sz="1400" dirty="0" smtClean="0"/>
+              <a:t>index</a:t>
+            </a:r>
+            <a:r>
+              <a:rPr lang="en-US" altLang="ja-JP" sz="1400" dirty="0" smtClean="0"/>
+              <a:t> </a:t>
+            </a:r>
+            <a:r>
+              <a:rPr lang="en-US" altLang="ja-JP" sz="1400" dirty="0" smtClean="0"/>
+              <a:t>= </a:t>
+            </a:r>
+            <a:r>
+              <a:rPr lang="en-US" altLang="ja-JP" sz="1400" dirty="0" err="1" smtClean="0"/>
+              <a:t>i</a:t>
+            </a:r>
+            <a:endParaRPr lang="en-US" altLang="ja-JP" sz="1400" dirty="0" smtClean="0"/>
+          </a:p>
+          <a:p>
+            <a:r>
+              <a:rPr kumimoji="1" lang="en-US" altLang="ja-JP" sz="1400" dirty="0" smtClean="0"/>
+              <a:t>Current swing </a:t>
+            </a:r>
+            <a:r>
+              <a:rPr kumimoji="1" lang="en-US" altLang="ja-JP" sz="1400" dirty="0" err="1" smtClean="0"/>
+              <a:t>dst</a:t>
+            </a:r>
+            <a:endParaRPr kumimoji="1" lang="ja-JP" altLang="en-US" sz="1400" dirty="0"/>
+          </a:p>
+        </p:txBody>
+      </p:sp>
+      <p:sp>
+        <p:nvSpPr>
+          <p:cNvPr id="63" name="テキスト ボックス 62"/>
+          <p:cNvSpPr txBox="1"/>
+          <p:nvPr/>
+        </p:nvSpPr>
+        <p:spPr>
+          <a:xfrm>
+            <a:off x="3063491" y="2748297"/>
+            <a:ext cx="6023508" cy="646331"/>
+          </a:xfrm>
+          <a:prstGeom prst="rect">
+            <a:avLst/>
+          </a:prstGeom>
+          <a:noFill/>
+        </p:spPr>
+        <p:txBody>
+          <a:bodyPr wrap="none" rtlCol="0">
+            <a:spAutoFit/>
+          </a:bodyPr>
+          <a:lstStyle/>
+          <a:p>
+            <a:r>
+              <a:rPr lang="en-US" altLang="ja-JP" dirty="0" smtClean="0"/>
+              <a:t>- </a:t>
+            </a:r>
+            <a:r>
+              <a:rPr lang="en-US" altLang="ja-JP" dirty="0" err="1" smtClean="0"/>
+              <a:t>Overwritable</a:t>
+            </a:r>
+            <a:r>
+              <a:rPr lang="en-US" altLang="ja-JP" dirty="0" smtClean="0"/>
+              <a:t> </a:t>
+            </a:r>
+            <a:r>
+              <a:rPr lang="en-US" altLang="ja-JP" dirty="0" smtClean="0"/>
+              <a:t>fs : i+1, i+2, </a:t>
+            </a:r>
+            <a:r>
+              <a:rPr lang="en-US" altLang="ja-JP" dirty="0" smtClean="0"/>
+              <a:t>…</a:t>
+            </a:r>
+          </a:p>
+          <a:p>
+            <a:r>
+              <a:rPr lang="en-US" altLang="ja-JP" dirty="0" smtClean="0"/>
+              <a:t>- </a:t>
+            </a:r>
+            <a:r>
+              <a:rPr lang="en-US" altLang="ja-JP" dirty="0" err="1" smtClean="0"/>
+              <a:t>overwrite_fs_index</a:t>
+            </a:r>
+            <a:r>
+              <a:rPr lang="en-US" altLang="ja-JP" dirty="0" smtClean="0"/>
+              <a:t>  : When you’d like to overwrite foot steps.</a:t>
+            </a:r>
+          </a:p>
+        </p:txBody>
+      </p:sp>
+      <p:sp>
+        <p:nvSpPr>
+          <p:cNvPr id="64" name="テキスト ボックス 63"/>
+          <p:cNvSpPr txBox="1"/>
+          <p:nvPr/>
+        </p:nvSpPr>
+        <p:spPr>
+          <a:xfrm>
+            <a:off x="-13530" y="3525755"/>
+            <a:ext cx="1610505" cy="307777"/>
+          </a:xfrm>
+          <a:prstGeom prst="rect">
+            <a:avLst/>
+          </a:prstGeom>
+          <a:noFill/>
+        </p:spPr>
+        <p:txBody>
+          <a:bodyPr wrap="none" rtlCol="0">
+            <a:spAutoFit/>
+          </a:bodyPr>
+          <a:lstStyle/>
+          <a:p>
+            <a:r>
+              <a:rPr lang="en-US" altLang="ja-JP" sz="1400" dirty="0" smtClean="0"/>
+              <a:t>Current support leg</a:t>
+            </a:r>
+            <a:endParaRPr kumimoji="1" lang="ja-JP" altLang="en-US" sz="1400" dirty="0"/>
+          </a:p>
+        </p:txBody>
+      </p:sp>
+      <p:sp>
+        <p:nvSpPr>
+          <p:cNvPr id="67" name="テキスト ボックス 66"/>
+          <p:cNvSpPr txBox="1"/>
+          <p:nvPr/>
+        </p:nvSpPr>
+        <p:spPr>
+          <a:xfrm>
+            <a:off x="3063491" y="3525755"/>
+            <a:ext cx="5643148" cy="1754326"/>
+          </a:xfrm>
+          <a:prstGeom prst="rect">
+            <a:avLst/>
+          </a:prstGeom>
+          <a:noFill/>
+        </p:spPr>
+        <p:txBody>
+          <a:bodyPr wrap="none" rtlCol="0">
+            <a:spAutoFit/>
+          </a:bodyPr>
+          <a:lstStyle/>
+          <a:p>
+            <a:r>
+              <a:rPr lang="en-US" altLang="ja-JP" dirty="0" smtClean="0"/>
+              <a:t>- Example : overwrite </a:t>
+            </a:r>
+            <a:r>
+              <a:rPr lang="en-US" altLang="ja-JP" dirty="0" smtClean="0"/>
+              <a:t>of </a:t>
+            </a:r>
+            <a:r>
+              <a:rPr lang="en-US" altLang="ja-JP" dirty="0" err="1" smtClean="0"/>
+              <a:t>i+k</a:t>
+            </a:r>
+            <a:r>
+              <a:rPr lang="en-US" altLang="ja-JP" dirty="0" smtClean="0"/>
+              <a:t> ( k&gt;=</a:t>
+            </a:r>
+            <a:r>
+              <a:rPr lang="en-US" altLang="ja-JP" dirty="0" smtClean="0"/>
+              <a:t>1)</a:t>
+            </a:r>
+          </a:p>
+          <a:p>
+            <a:r>
+              <a:rPr lang="en-US" altLang="ja-JP" dirty="0"/>
+              <a:t> </a:t>
+            </a:r>
+            <a:r>
+              <a:rPr lang="en-US" altLang="ja-JP" dirty="0" smtClean="0"/>
+              <a:t>   </a:t>
+            </a:r>
+            <a:r>
+              <a:rPr lang="en-US" altLang="ja-JP" dirty="0" err="1" smtClean="0"/>
+              <a:t>overwrite_fs_index</a:t>
+            </a:r>
+            <a:r>
+              <a:rPr lang="en-US" altLang="ja-JP" dirty="0" smtClean="0"/>
+              <a:t> = </a:t>
+            </a:r>
+            <a:r>
+              <a:rPr lang="en-US" altLang="ja-JP" dirty="0" err="1" smtClean="0"/>
+              <a:t>i+k</a:t>
+            </a:r>
+            <a:endParaRPr lang="en-US" altLang="ja-JP" dirty="0" smtClean="0"/>
+          </a:p>
+          <a:p>
+            <a:r>
+              <a:rPr kumimoji="1" lang="en-US" altLang="ja-JP" dirty="0"/>
+              <a:t> </a:t>
+            </a:r>
+            <a:r>
+              <a:rPr kumimoji="1" lang="en-US" altLang="ja-JP" dirty="0" smtClean="0"/>
+              <a:t> </a:t>
+            </a:r>
+            <a:r>
+              <a:rPr kumimoji="1" lang="en-US" altLang="ja-JP" dirty="0" smtClean="0"/>
+              <a:t>  Support </a:t>
+            </a:r>
+            <a:r>
+              <a:rPr kumimoji="1" lang="en-US" altLang="ja-JP" dirty="0" smtClean="0"/>
+              <a:t>leg : remain[k-1] = fs[i+k-1]</a:t>
+            </a:r>
+          </a:p>
+          <a:p>
+            <a:r>
+              <a:rPr lang="en-US" altLang="ja-JP" dirty="0"/>
+              <a:t> </a:t>
+            </a:r>
+            <a:r>
+              <a:rPr lang="en-US" altLang="ja-JP" dirty="0" smtClean="0"/>
+              <a:t> </a:t>
+            </a:r>
+            <a:r>
+              <a:rPr lang="en-US" altLang="ja-JP" dirty="0" smtClean="0"/>
+              <a:t>  </a:t>
+            </a:r>
+            <a:r>
+              <a:rPr lang="en-US" altLang="ja-JP" dirty="0" err="1" smtClean="0"/>
+              <a:t>new_foot_steps</a:t>
+            </a:r>
+            <a:r>
+              <a:rPr lang="en-US" altLang="ja-JP" dirty="0" smtClean="0"/>
+              <a:t>  : </a:t>
+            </a:r>
+            <a:r>
+              <a:rPr lang="en-US" altLang="ja-JP" dirty="0" smtClean="0"/>
+              <a:t>[remain[k-1], </a:t>
+            </a:r>
+            <a:r>
+              <a:rPr lang="en-US" altLang="ja-JP" dirty="0" err="1" smtClean="0"/>
+              <a:t>newfs</a:t>
+            </a:r>
+            <a:r>
+              <a:rPr lang="en-US" altLang="ja-JP" dirty="0" smtClean="0"/>
+              <a:t>[1],   </a:t>
+            </a:r>
+            <a:r>
+              <a:rPr lang="en-US" altLang="ja-JP" dirty="0" err="1" smtClean="0"/>
+              <a:t>newfs</a:t>
+            </a:r>
+            <a:r>
+              <a:rPr lang="en-US" altLang="ja-JP" dirty="0" smtClean="0"/>
+              <a:t>[2], … ]</a:t>
+            </a:r>
+          </a:p>
+          <a:p>
+            <a:r>
+              <a:rPr kumimoji="1" lang="en-US" altLang="ja-JP" dirty="0"/>
+              <a:t> </a:t>
+            </a:r>
+            <a:r>
+              <a:rPr kumimoji="1" lang="en-US" altLang="ja-JP" dirty="0" smtClean="0"/>
+              <a:t>   </a:t>
+            </a:r>
+            <a:r>
+              <a:rPr kumimoji="1" lang="en-US" altLang="ja-JP" dirty="0" smtClean="0"/>
+              <a:t>                 </a:t>
+            </a:r>
+            <a:r>
+              <a:rPr kumimoji="1" lang="en-US" altLang="ja-JP" dirty="0" smtClean="0"/>
+              <a:t>index    : </a:t>
+            </a:r>
+            <a:r>
+              <a:rPr kumimoji="1" lang="en-US" altLang="ja-JP" dirty="0" smtClean="0"/>
+              <a:t>[i</a:t>
+            </a:r>
+            <a:r>
+              <a:rPr lang="en-US" altLang="ja-JP" dirty="0" smtClean="0"/>
+              <a:t>+k-1                </a:t>
+            </a:r>
+            <a:r>
+              <a:rPr lang="en-US" altLang="ja-JP" dirty="0" err="1" smtClean="0"/>
+              <a:t>i+k</a:t>
+            </a:r>
+            <a:r>
+              <a:rPr lang="en-US" altLang="ja-JP" dirty="0" smtClean="0"/>
+              <a:t>              i+k+1, </a:t>
+            </a:r>
+            <a:r>
+              <a:rPr lang="en-US" altLang="ja-JP" dirty="0" smtClean="0"/>
+              <a:t>…]</a:t>
+            </a:r>
+            <a:endParaRPr lang="en-US" altLang="ja-JP" dirty="0" smtClean="0"/>
+          </a:p>
+          <a:p>
+            <a:r>
+              <a:rPr lang="en-US" altLang="ja-JP" dirty="0"/>
+              <a:t> </a:t>
+            </a:r>
+            <a:r>
+              <a:rPr lang="en-US" altLang="ja-JP" dirty="0" smtClean="0"/>
+              <a:t>  </a:t>
+            </a:r>
+            <a:r>
+              <a:rPr lang="en-US" altLang="ja-JP" dirty="0" smtClean="0"/>
+              <a:t> </a:t>
+            </a:r>
+            <a:r>
+              <a:rPr lang="en-US" altLang="ja-JP" dirty="0" err="1" smtClean="0"/>
+              <a:t>overwrite_fs_list</a:t>
+            </a:r>
+            <a:r>
+              <a:rPr lang="en-US" altLang="ja-JP" dirty="0" smtClean="0"/>
+              <a:t>  </a:t>
+            </a:r>
+            <a:r>
+              <a:rPr lang="en-US" altLang="ja-JP" dirty="0"/>
+              <a:t>: [</a:t>
+            </a:r>
+            <a:r>
+              <a:rPr lang="en-US" altLang="ja-JP" dirty="0" err="1"/>
+              <a:t>newfs</a:t>
+            </a:r>
+            <a:r>
+              <a:rPr lang="en-US" altLang="ja-JP" dirty="0"/>
+              <a:t>[1], </a:t>
+            </a:r>
+            <a:r>
+              <a:rPr lang="en-US" altLang="ja-JP" dirty="0" err="1"/>
+              <a:t>newfs</a:t>
+            </a:r>
+            <a:r>
+              <a:rPr lang="en-US" altLang="ja-JP" dirty="0"/>
+              <a:t>[2], …]</a:t>
+            </a:r>
+            <a:endParaRPr kumimoji="1" lang="ja-JP" altLang="en-US" dirty="0"/>
+          </a:p>
+        </p:txBody>
+      </p:sp>
+      <p:sp>
+        <p:nvSpPr>
+          <p:cNvPr id="68" name="テキスト ボックス 67"/>
+          <p:cNvSpPr txBox="1"/>
+          <p:nvPr/>
+        </p:nvSpPr>
+        <p:spPr>
+          <a:xfrm>
+            <a:off x="3082683" y="5280081"/>
+            <a:ext cx="6937412" cy="1631216"/>
+          </a:xfrm>
+          <a:prstGeom prst="rect">
+            <a:avLst/>
+          </a:prstGeom>
+          <a:noFill/>
+        </p:spPr>
+        <p:txBody>
+          <a:bodyPr wrap="none" rtlCol="0">
+            <a:spAutoFit/>
+          </a:bodyPr>
+          <a:lstStyle/>
+          <a:p>
+            <a:r>
+              <a:rPr lang="en-US" altLang="ja-JP" dirty="0" smtClean="0"/>
+              <a:t>- Behavior</a:t>
+            </a:r>
+            <a:endParaRPr lang="en-US" altLang="ja-JP" dirty="0" smtClean="0"/>
+          </a:p>
+          <a:p>
+            <a:r>
+              <a:rPr lang="en-US" altLang="ja-JP" dirty="0"/>
+              <a:t> </a:t>
+            </a:r>
+            <a:r>
+              <a:rPr lang="en-US" altLang="ja-JP" dirty="0" smtClean="0"/>
+              <a:t>  Wait until current </a:t>
+            </a:r>
+            <a:r>
+              <a:rPr lang="en-US" altLang="ja-JP" dirty="0" err="1" smtClean="0"/>
+              <a:t>fs_index</a:t>
+            </a:r>
+            <a:r>
+              <a:rPr lang="en-US" altLang="ja-JP" dirty="0" smtClean="0"/>
+              <a:t> = </a:t>
+            </a:r>
+            <a:r>
+              <a:rPr lang="en-US" altLang="ja-JP" dirty="0" err="1" smtClean="0"/>
+              <a:t>overwrite_footstep_index</a:t>
+            </a:r>
+            <a:r>
+              <a:rPr lang="en-US" altLang="ja-JP" dirty="0" smtClean="0"/>
+              <a:t> -1 </a:t>
+            </a:r>
+          </a:p>
+          <a:p>
+            <a:r>
+              <a:rPr lang="en-US" altLang="ja-JP" dirty="0"/>
+              <a:t> </a:t>
+            </a:r>
+            <a:r>
+              <a:rPr lang="en-US" altLang="ja-JP" dirty="0" smtClean="0"/>
+              <a:t> </a:t>
+            </a:r>
+            <a:r>
+              <a:rPr lang="en-US" altLang="ja-JP" dirty="0" smtClean="0"/>
+              <a:t>If </a:t>
+            </a:r>
+            <a:r>
+              <a:rPr lang="en-US" altLang="ja-JP" dirty="0" smtClean="0"/>
+              <a:t>current </a:t>
+            </a:r>
+            <a:r>
+              <a:rPr lang="en-US" altLang="ja-JP" dirty="0" err="1" smtClean="0"/>
+              <a:t>fs_index</a:t>
+            </a:r>
+            <a:r>
+              <a:rPr lang="en-US" altLang="ja-JP" dirty="0" smtClean="0"/>
+              <a:t> </a:t>
+            </a:r>
+            <a:r>
+              <a:rPr lang="en-US" altLang="ja-JP" dirty="0" smtClean="0"/>
+              <a:t>&gt;</a:t>
+            </a:r>
+            <a:r>
+              <a:rPr lang="en-US" altLang="ja-JP" dirty="0" err="1" smtClean="0"/>
+              <a:t>overwrite_footstep_index</a:t>
+            </a:r>
+            <a:r>
+              <a:rPr lang="en-US" altLang="ja-JP" dirty="0" smtClean="0"/>
+              <a:t> -1 =&gt; neglect (or estop?)</a:t>
+            </a:r>
+          </a:p>
+          <a:p>
+            <a:pPr marL="285750" indent="-285750">
+              <a:buFontTx/>
+              <a:buChar char="-"/>
+            </a:pPr>
+            <a:r>
+              <a:rPr lang="en-US" altLang="ja-JP" dirty="0" smtClean="0"/>
+              <a:t>Sample code</a:t>
+            </a:r>
+          </a:p>
+          <a:p>
+            <a:r>
+              <a:rPr lang="en-US" altLang="ja-JP" sz="1400" dirty="0" smtClean="0"/>
+              <a:t> </a:t>
+            </a:r>
+            <a:r>
+              <a:rPr lang="en-US" altLang="ja-JP" sz="1400" i="1" dirty="0" err="1" smtClean="0"/>
+              <a:t>demoGaitGeneratorOverwriteFootsteps</a:t>
+            </a:r>
+            <a:r>
+              <a:rPr lang="en-US" altLang="ja-JP" sz="1400" dirty="0" smtClean="0"/>
+              <a:t>() in samplerobot_auto_balancer.py </a:t>
+            </a:r>
+          </a:p>
+          <a:p>
+            <a:r>
+              <a:rPr lang="en-US" altLang="ja-JP" sz="1400" dirty="0"/>
+              <a:t> </a:t>
+            </a:r>
+            <a:r>
+              <a:rPr lang="en-US" altLang="ja-JP" sz="1400" i="1" dirty="0" smtClean="0"/>
+              <a:t>(samplerobot-auto-balancer-demo19</a:t>
+            </a:r>
+            <a:r>
+              <a:rPr lang="en-US" altLang="ja-JP" sz="1400" dirty="0" smtClean="0"/>
+              <a:t>) in </a:t>
+            </a:r>
+            <a:r>
+              <a:rPr lang="en-US" altLang="ja-JP" sz="1400" dirty="0" err="1" smtClean="0"/>
+              <a:t>samplerobot</a:t>
+            </a:r>
+            <a:r>
+              <a:rPr lang="en-US" altLang="ja-JP" sz="1400" dirty="0" smtClean="0"/>
+              <a:t>-auto-</a:t>
+            </a:r>
+            <a:r>
+              <a:rPr lang="en-US" altLang="ja-JP" sz="1400" dirty="0" err="1" smtClean="0"/>
+              <a:t>balancer.l</a:t>
+            </a:r>
+            <a:endParaRPr lang="en-US" altLang="ja-JP" sz="1400" dirty="0" smtClean="0"/>
+          </a:p>
+        </p:txBody>
+      </p:sp>
+      <p:sp>
+        <p:nvSpPr>
+          <p:cNvPr id="16" name="テキスト ボックス 15"/>
+          <p:cNvSpPr txBox="1"/>
+          <p:nvPr/>
+        </p:nvSpPr>
+        <p:spPr>
+          <a:xfrm>
+            <a:off x="3063491" y="1809706"/>
+            <a:ext cx="3467616" cy="923330"/>
+          </a:xfrm>
+          <a:prstGeom prst="rect">
+            <a:avLst/>
+          </a:prstGeom>
+          <a:noFill/>
+        </p:spPr>
+        <p:txBody>
+          <a:bodyPr wrap="none" rtlCol="0">
+            <a:spAutoFit/>
+          </a:bodyPr>
+          <a:lstStyle/>
+          <a:p>
+            <a:r>
+              <a:rPr lang="en-US" altLang="ja-JP" dirty="0" smtClean="0"/>
+              <a:t>- </a:t>
+            </a:r>
+            <a:r>
+              <a:rPr lang="en-US" altLang="ja-JP" dirty="0" err="1" smtClean="0"/>
+              <a:t>getR</a:t>
+            </a:r>
+            <a:r>
+              <a:rPr lang="en-US" altLang="ja-JP" dirty="0" err="1" smtClean="0"/>
+              <a:t>emainingFootStepSequence</a:t>
+            </a:r>
+            <a:r>
+              <a:rPr lang="en-US" altLang="ja-JP" dirty="0" smtClean="0"/>
+              <a:t> :</a:t>
+            </a:r>
+          </a:p>
+          <a:p>
+            <a:r>
+              <a:rPr lang="en-US" altLang="ja-JP" dirty="0"/>
+              <a:t> </a:t>
+            </a:r>
+            <a:r>
+              <a:rPr lang="en-US" altLang="ja-JP" dirty="0" smtClean="0"/>
+              <a:t>  </a:t>
+            </a:r>
+            <a:r>
+              <a:rPr lang="en-US" altLang="ja-JP" dirty="0" smtClean="0"/>
+              <a:t>remain</a:t>
+            </a:r>
+            <a:r>
+              <a:rPr lang="en-US" altLang="ja-JP" dirty="0" smtClean="0"/>
+              <a:t>=[ fs[</a:t>
+            </a:r>
+            <a:r>
+              <a:rPr lang="en-US" altLang="ja-JP" dirty="0" err="1" smtClean="0"/>
+              <a:t>i</a:t>
+            </a:r>
+            <a:r>
+              <a:rPr lang="en-US" altLang="ja-JP" dirty="0" smtClean="0"/>
+              <a:t>], fs[i+1], fs[i+2], … </a:t>
+            </a:r>
+            <a:r>
+              <a:rPr lang="en-US" altLang="ja-JP" dirty="0" smtClean="0"/>
+              <a:t>]</a:t>
+            </a:r>
+          </a:p>
+          <a:p>
+            <a:r>
+              <a:rPr kumimoji="1" lang="en-US" altLang="ja-JP" dirty="0"/>
+              <a:t> </a:t>
+            </a:r>
+            <a:r>
+              <a:rPr kumimoji="1" lang="en-US" altLang="ja-JP" dirty="0" smtClean="0"/>
+              <a:t>  </a:t>
+            </a:r>
+            <a:r>
+              <a:rPr kumimoji="1" lang="en-US" altLang="ja-JP" dirty="0" err="1" smtClean="0"/>
+              <a:t>current_footste_index</a:t>
+            </a:r>
+            <a:r>
+              <a:rPr kumimoji="1" lang="en-US" altLang="ja-JP" dirty="0" smtClean="0"/>
+              <a:t>  </a:t>
+            </a:r>
+            <a:endParaRPr kumimoji="1" lang="ja-JP" altLang="en-US" dirty="0"/>
+          </a:p>
+        </p:txBody>
+      </p:sp>
+      <p:sp>
+        <p:nvSpPr>
+          <p:cNvPr id="17" name="テキスト ボックス 16"/>
+          <p:cNvSpPr txBox="1"/>
+          <p:nvPr/>
+        </p:nvSpPr>
+        <p:spPr>
+          <a:xfrm>
+            <a:off x="2404901" y="757315"/>
+            <a:ext cx="6086987" cy="923330"/>
+          </a:xfrm>
+          <a:prstGeom prst="rect">
+            <a:avLst/>
+          </a:prstGeom>
+          <a:noFill/>
+        </p:spPr>
+        <p:txBody>
+          <a:bodyPr wrap="none" rtlCol="0">
+            <a:spAutoFit/>
+          </a:bodyPr>
+          <a:lstStyle/>
+          <a:p>
+            <a:r>
+              <a:rPr kumimoji="1" lang="en-US" altLang="ja-JP" b="1" dirty="0" smtClean="0"/>
+              <a:t>Step1. </a:t>
+            </a:r>
+            <a:r>
+              <a:rPr kumimoji="1" lang="en-US" altLang="ja-JP" b="1" dirty="0" err="1" smtClean="0"/>
+              <a:t>getRamainingFootStepSequence</a:t>
+            </a:r>
+            <a:endParaRPr kumimoji="1" lang="en-US" altLang="ja-JP" b="1" dirty="0" smtClean="0"/>
+          </a:p>
+          <a:p>
+            <a:r>
+              <a:rPr lang="en-US" altLang="ja-JP" b="1" dirty="0" smtClean="0"/>
+              <a:t>Step2. calculate new footsteps and decide </a:t>
+            </a:r>
+            <a:r>
+              <a:rPr lang="en-US" altLang="ja-JP" b="1" dirty="0" err="1" smtClean="0"/>
+              <a:t>overwrite_fs_index</a:t>
+            </a:r>
+            <a:endParaRPr lang="en-US" altLang="ja-JP" b="1" dirty="0" smtClean="0"/>
+          </a:p>
+          <a:p>
+            <a:r>
+              <a:rPr kumimoji="1" lang="en-US" altLang="ja-JP" b="1" dirty="0" smtClean="0"/>
+              <a:t>Step3. </a:t>
+            </a:r>
+            <a:r>
+              <a:rPr kumimoji="1" lang="en-US" altLang="ja-JP" b="1" dirty="0" err="1" smtClean="0"/>
+              <a:t>setFootStep</a:t>
+            </a:r>
+            <a:r>
+              <a:rPr kumimoji="1" lang="en-US" altLang="ja-JP" b="1" dirty="0" smtClean="0"/>
+              <a:t>(</a:t>
+            </a:r>
+            <a:r>
+              <a:rPr kumimoji="1" lang="en-US" altLang="ja-JP" b="1" dirty="0" err="1" smtClean="0"/>
+              <a:t>new_foot_steps</a:t>
+            </a:r>
+            <a:r>
+              <a:rPr lang="en-US" altLang="ja-JP" b="1" dirty="0" smtClean="0"/>
+              <a:t>, </a:t>
+            </a:r>
+            <a:r>
+              <a:rPr lang="en-US" altLang="ja-JP" b="1" dirty="0" err="1" smtClean="0"/>
+              <a:t>overwrite_fs_index</a:t>
+            </a:r>
+            <a:r>
+              <a:rPr lang="en-US" altLang="ja-JP" b="1" dirty="0" smtClean="0"/>
+              <a:t>)</a:t>
+            </a:r>
+            <a:endParaRPr kumimoji="1" lang="ja-JP" altLang="en-US" b="1" dirty="0"/>
+          </a:p>
+        </p:txBody>
+      </p:sp>
+    </p:spTree>
+    <p:extLst>
+      <p:ext uri="{BB962C8B-B14F-4D97-AF65-F5344CB8AC3E}">
+        <p14:creationId xmlns:p14="http://schemas.microsoft.com/office/powerpoint/2010/main" val="1787548610"/>
       </p:ext>
     </p:extLst>
   </p:cSld>

</xml_diff>